<commit_message>
proposal references and table of figures added. also front page and cover added. only my new idea remained.
</commit_message>
<xml_diff>
--- a/my powerpoints/new idea in proposal.pptx
+++ b/my powerpoints/new idea in proposal.pptx
@@ -7,12 +7,12 @@
   <p:sldIdLst>
     <p:sldId id="256" r:id="rId2"/>
     <p:sldId id="257" r:id="rId3"/>
-    <p:sldId id="263" r:id="rId4"/>
-    <p:sldId id="258" r:id="rId5"/>
-    <p:sldId id="259" r:id="rId6"/>
-    <p:sldId id="260" r:id="rId7"/>
-    <p:sldId id="261" r:id="rId8"/>
-    <p:sldId id="262" r:id="rId9"/>
+    <p:sldId id="258" r:id="rId4"/>
+    <p:sldId id="259" r:id="rId5"/>
+    <p:sldId id="260" r:id="rId6"/>
+    <p:sldId id="261" r:id="rId7"/>
+    <p:sldId id="262" r:id="rId8"/>
+    <p:sldId id="263" r:id="rId9"/>
   </p:sldIdLst>
   <p:sldSz cx="12192000" cy="6858000"/>
   <p:notesSz cx="6858000" cy="9144000"/>
@@ -118,12 +118,12 @@
           <p14:sldIdLst>
             <p14:sldId id="256"/>
             <p14:sldId id="257"/>
-            <p14:sldId id="263"/>
             <p14:sldId id="258"/>
             <p14:sldId id="259"/>
             <p14:sldId id="260"/>
             <p14:sldId id="261"/>
             <p14:sldId id="262"/>
+            <p14:sldId id="263"/>
           </p14:sldIdLst>
         </p14:section>
       </p14:sectionLst>
@@ -3161,7 +3161,9 @@
           </a:xfrm>
         </p:spPr>
         <p:txBody>
-          <a:bodyPr/>
+          <a:bodyPr>
+            <a:normAutofit fontScale="92500" lnSpcReduction="10000"/>
+          </a:bodyPr>
           <a:lstStyle/>
           <a:p>
             <a:pPr marL="514350" indent="-514350" algn="r" rtl="1">
@@ -3202,8 +3204,23 @@
               <a:rPr lang="fa-IR" dirty="0" smtClean="0">
                 <a:cs typeface="B Nazanin" panose="00000400000000000000" pitchFamily="2" charset="-78"/>
               </a:rPr>
-              <a:t>قالب های تعریف شده فقط بخشی از جمله را شامل میشوند</a:t>
-            </a:r>
+              <a:t>قالب های تعریف شده فقط بخشی از جمله را شامل </a:t>
+            </a:r>
+            <a:r>
+              <a:rPr lang="fa-IR" dirty="0">
+                <a:cs typeface="B Nazanin" panose="00000400000000000000" pitchFamily="2" charset="-78"/>
+              </a:rPr>
+              <a:t>میشوندمیشوند(قالب های تعریف شده محدود است ولی مال ما نامحدود</a:t>
+            </a:r>
+            <a:r>
+              <a:rPr lang="fa-IR" dirty="0" smtClean="0">
+                <a:cs typeface="B Nazanin" panose="00000400000000000000" pitchFamily="2" charset="-78"/>
+              </a:rPr>
+              <a:t>)</a:t>
+            </a:r>
+            <a:endParaRPr lang="fa-IR" dirty="0" smtClean="0">
+              <a:cs typeface="B Nazanin" panose="00000400000000000000" pitchFamily="2" charset="-78"/>
+            </a:endParaRPr>
           </a:p>
           <a:p>
             <a:pPr marL="514350" indent="-514350" algn="r" rtl="1">
@@ -3241,14 +3258,29 @@
               <a:rPr lang="fa-IR" dirty="0">
                 <a:cs typeface="B Nazanin" panose="00000400000000000000" pitchFamily="2" charset="-78"/>
               </a:rPr>
-              <a:t>استخراج روابط مفهومی از جملات ساده و در نظر نگرفتن جملات </a:t>
+              <a:t>استخراج روابط </a:t>
             </a:r>
             <a:r>
               <a:rPr lang="fa-IR" dirty="0" smtClean="0">
                 <a:cs typeface="B Nazanin" panose="00000400000000000000" pitchFamily="2" charset="-78"/>
               </a:rPr>
-              <a:t>برزگ انجام میگرفته است</a:t>
-            </a:r>
+              <a:t>مفهومی تنها </a:t>
+            </a:r>
+            <a:r>
+              <a:rPr lang="fa-IR" dirty="0">
+                <a:cs typeface="B Nazanin" panose="00000400000000000000" pitchFamily="2" charset="-78"/>
+              </a:rPr>
+              <a:t>از جملات </a:t>
+            </a:r>
+            <a:r>
+              <a:rPr lang="fa-IR" dirty="0" smtClean="0">
+                <a:cs typeface="B Nazanin" panose="00000400000000000000" pitchFamily="2" charset="-78"/>
+              </a:rPr>
+              <a:t>ساده صورت میگرفته است</a:t>
+            </a:r>
+            <a:endParaRPr lang="fa-IR" dirty="0" smtClean="0">
+              <a:cs typeface="B Nazanin" panose="00000400000000000000" pitchFamily="2" charset="-78"/>
+            </a:endParaRPr>
           </a:p>
           <a:p>
             <a:pPr marL="514350" indent="-514350" algn="r" rtl="1">
@@ -3318,147 +3350,6 @@
               <a:rPr lang="fa-IR" b="1" dirty="0" smtClean="0">
                 <a:cs typeface="B Zar" panose="00000400000000000000" pitchFamily="2" charset="-78"/>
               </a:rPr>
-              <a:t>ویژگی ها و مزایای روش پیشنهادی</a:t>
-            </a:r>
-            <a:endParaRPr lang="en-US" b="1" dirty="0">
-              <a:cs typeface="B Zar" panose="00000400000000000000" pitchFamily="2" charset="-78"/>
-            </a:endParaRPr>
-          </a:p>
-        </p:txBody>
-      </p:sp>
-      <p:sp>
-        <p:nvSpPr>
-          <p:cNvPr id="3" name="Content Placeholder 2"/>
-          <p:cNvSpPr>
-            <a:spLocks noGrp="1"/>
-          </p:cNvSpPr>
-          <p:nvPr>
-            <p:ph idx="1"/>
-          </p:nvPr>
-        </p:nvSpPr>
-        <p:spPr/>
-        <p:txBody>
-          <a:bodyPr/>
-          <a:lstStyle/>
-          <a:p>
-            <a:pPr algn="r" rtl="1"/>
-            <a:r>
-              <a:rPr lang="fa-IR" dirty="0" smtClean="0">
-                <a:cs typeface="B Nazanin" panose="00000400000000000000" pitchFamily="2" charset="-78"/>
-              </a:rPr>
-              <a:t>فکر میکنیم در صورت تولید بانک قالب ها روی کل جمله، یک پارسر </a:t>
-            </a:r>
-            <a:r>
-              <a:rPr lang="en-US" dirty="0" smtClean="0">
-                <a:cs typeface="B Nazanin" panose="00000400000000000000" pitchFamily="2" charset="-78"/>
-              </a:rPr>
-              <a:t>top down</a:t>
-            </a:r>
-            <a:r>
-              <a:rPr lang="fa-IR" dirty="0" smtClean="0">
-                <a:cs typeface="B Nazanin" panose="00000400000000000000" pitchFamily="2" charset="-78"/>
-              </a:rPr>
-              <a:t> برای جمله خواهیم داشت.</a:t>
-            </a:r>
-          </a:p>
-          <a:p>
-            <a:pPr algn="r" rtl="1"/>
-            <a:r>
-              <a:rPr lang="fa-IR" dirty="0" smtClean="0">
-                <a:cs typeface="B Nazanin" panose="00000400000000000000" pitchFamily="2" charset="-78"/>
-              </a:rPr>
-              <a:t>به کمک این قالبها میتوان گروههای اسمی درون جمله را استخراج کرد.</a:t>
-            </a:r>
-          </a:p>
-          <a:p>
-            <a:pPr algn="r" rtl="1"/>
-            <a:r>
-              <a:rPr lang="fa-IR" dirty="0" smtClean="0">
-                <a:cs typeface="B Nazanin" panose="00000400000000000000" pitchFamily="2" charset="-78"/>
-              </a:rPr>
-              <a:t>روابط چندگانه درون جمله که دارای بیش از دو آرگومان است را میتوان استخراج کرد.</a:t>
-            </a:r>
-          </a:p>
-          <a:p>
-            <a:pPr algn="r" rtl="1"/>
-            <a:r>
-              <a:rPr lang="fa-IR" smtClean="0">
-                <a:cs typeface="B Nazanin" panose="00000400000000000000" pitchFamily="2" charset="-78"/>
-              </a:rPr>
-              <a:t>با استفاده </a:t>
-            </a:r>
-            <a:r>
-              <a:rPr lang="fa-IR" dirty="0" smtClean="0">
-                <a:cs typeface="B Nazanin" panose="00000400000000000000" pitchFamily="2" charset="-78"/>
-              </a:rPr>
-              <a:t>از یک آزمایش روی حدود صد جمله کوتاه فارسی نشان داده ایم که قالب ها در جملات تکرار میشوند. </a:t>
-            </a:r>
-          </a:p>
-          <a:p>
-            <a:pPr algn="r" rtl="1"/>
-            <a:endParaRPr lang="en-US" dirty="0">
-              <a:cs typeface="B Nazanin" panose="00000400000000000000" pitchFamily="2" charset="-78"/>
-            </a:endParaRPr>
-          </a:p>
-        </p:txBody>
-      </p:sp>
-    </p:spTree>
-    <p:extLst>
-      <p:ext uri="{BB962C8B-B14F-4D97-AF65-F5344CB8AC3E}">
-        <p14:creationId xmlns:p14="http://schemas.microsoft.com/office/powerpoint/2010/main" val="1027177853"/>
-      </p:ext>
-    </p:extLst>
-  </p:cSld>
-  <p:clrMapOvr>
-    <a:masterClrMapping/>
-  </p:clrMapOvr>
-  <p:timing>
-    <p:tnLst>
-      <p:par>
-        <p:cTn id="1" dur="indefinite" restart="never" nodeType="tmRoot"/>
-      </p:par>
-    </p:tnLst>
-  </p:timing>
-</p:sld>
-</file>
-
-<file path=ppt/slides/slide4.xml><?xml version="1.0" encoding="utf-8"?>
-<p:sld xmlns:a="http://schemas.openxmlformats.org/drawingml/2006/main" xmlns:r="http://schemas.openxmlformats.org/officeDocument/2006/relationships" xmlns:p="http://schemas.openxmlformats.org/presentationml/2006/main">
-  <p:cSld>
-    <p:spTree>
-      <p:nvGrpSpPr>
-        <p:cNvPr id="1" name=""/>
-        <p:cNvGrpSpPr/>
-        <p:nvPr/>
-      </p:nvGrpSpPr>
-      <p:grpSpPr>
-        <a:xfrm>
-          <a:off x="0" y="0"/>
-          <a:ext cx="0" cy="0"/>
-          <a:chOff x="0" y="0"/>
-          <a:chExt cx="0" cy="0"/>
-        </a:xfrm>
-      </p:grpSpPr>
-      <p:sp>
-        <p:nvSpPr>
-          <p:cNvPr id="2" name="Title 1"/>
-          <p:cNvSpPr>
-            <a:spLocks noGrp="1"/>
-          </p:cNvSpPr>
-          <p:nvPr>
-            <p:ph type="title"/>
-          </p:nvPr>
-        </p:nvSpPr>
-        <p:spPr/>
-        <p:txBody>
-          <a:bodyPr/>
-          <a:lstStyle/>
-          <a:p>
-            <a:pPr algn="ctr"/>
-            <a:r>
-              <a:rPr lang="fa-IR" b="1" dirty="0" smtClean="0">
-                <a:cs typeface="B Zar" panose="00000400000000000000" pitchFamily="2" charset="-78"/>
-              </a:rPr>
               <a:t>مراحل الگوریتم</a:t>
             </a:r>
             <a:endParaRPr lang="en-US" dirty="0"/>
@@ -3651,7 +3542,7 @@
 </p:sld>
 </file>
 
-<file path=ppt/slides/slide5.xml><?xml version="1.0" encoding="utf-8"?>
+<file path=ppt/slides/slide4.xml><?xml version="1.0" encoding="utf-8"?>
 <p:sld xmlns:a="http://schemas.openxmlformats.org/drawingml/2006/main" xmlns:r="http://schemas.openxmlformats.org/officeDocument/2006/relationships" xmlns:p="http://schemas.openxmlformats.org/presentationml/2006/main">
   <p:cSld>
     <p:spTree>
@@ -3801,7 +3692,7 @@
           <a:graphicData uri="http://schemas.openxmlformats.org/presentationml/2006/ole">
             <mc:AlternateContent xmlns:mc="http://schemas.openxmlformats.org/markup-compatibility/2006">
               <mc:Choice xmlns:v="urn:schemas-microsoft-com:vml" Requires="v">
-                <p:oleObj spid="_x0000_s1079" name="Bitmap Image" r:id="rId3" imgW="5649114" imgH="7287642" progId="Paint.Picture">
+                <p:oleObj spid="_x0000_s1083" name="Bitmap Image" r:id="rId3" imgW="5649114" imgH="7287642" progId="Paint.Picture">
                   <p:embed/>
                 </p:oleObj>
               </mc:Choice>
@@ -3866,6 +3757,179 @@
 </p:sld>
 </file>
 
+<file path=ppt/slides/slide5.xml><?xml version="1.0" encoding="utf-8"?>
+<p:sld xmlns:a="http://schemas.openxmlformats.org/drawingml/2006/main" xmlns:r="http://schemas.openxmlformats.org/officeDocument/2006/relationships" xmlns:p="http://schemas.openxmlformats.org/presentationml/2006/main">
+  <p:cSld>
+    <p:spTree>
+      <p:nvGrpSpPr>
+        <p:cNvPr id="1" name=""/>
+        <p:cNvGrpSpPr/>
+        <p:nvPr/>
+      </p:nvGrpSpPr>
+      <p:grpSpPr>
+        <a:xfrm>
+          <a:off x="0" y="0"/>
+          <a:ext cx="0" cy="0"/>
+          <a:chOff x="0" y="0"/>
+          <a:chExt cx="0" cy="0"/>
+        </a:xfrm>
+      </p:grpSpPr>
+      <p:sp>
+        <p:nvSpPr>
+          <p:cNvPr id="2" name="Title 1"/>
+          <p:cNvSpPr>
+            <a:spLocks noGrp="1"/>
+          </p:cNvSpPr>
+          <p:nvPr>
+            <p:ph type="title"/>
+          </p:nvPr>
+        </p:nvSpPr>
+        <p:spPr/>
+        <p:txBody>
+          <a:bodyPr/>
+          <a:lstStyle/>
+          <a:p>
+            <a:pPr algn="ctr"/>
+            <a:r>
+              <a:rPr lang="fa-IR" b="1" dirty="0" smtClean="0">
+                <a:cs typeface="B Zar" panose="00000400000000000000" pitchFamily="2" charset="-78"/>
+              </a:rPr>
+              <a:t>الگوریتم تولید قالب جمله</a:t>
+            </a:r>
+            <a:endParaRPr lang="en-US" b="1" dirty="0">
+              <a:cs typeface="B Zar" panose="00000400000000000000" pitchFamily="2" charset="-78"/>
+            </a:endParaRPr>
+          </a:p>
+        </p:txBody>
+      </p:sp>
+      <p:sp>
+        <p:nvSpPr>
+          <p:cNvPr id="3" name="Content Placeholder 2"/>
+          <p:cNvSpPr>
+            <a:spLocks noGrp="1"/>
+          </p:cNvSpPr>
+          <p:nvPr>
+            <p:ph idx="1"/>
+          </p:nvPr>
+        </p:nvSpPr>
+        <p:spPr/>
+        <p:txBody>
+          <a:bodyPr>
+            <a:normAutofit fontScale="85000" lnSpcReduction="20000"/>
+          </a:bodyPr>
+          <a:lstStyle/>
+          <a:p>
+            <a:pPr marL="514350" indent="-514350" algn="r" rtl="1">
+              <a:buFont typeface="+mj-lt"/>
+              <a:buAutoNum type="arabicPeriod"/>
+            </a:pPr>
+            <a:r>
+              <a:rPr lang="fa-IR" dirty="0" smtClean="0">
+                <a:cs typeface="B Nazanin" panose="00000400000000000000" pitchFamily="2" charset="-78"/>
+              </a:rPr>
+              <a:t>تشخیص فعل جمله (کمکی بودن یا اصلی بودن، مرکب بودن یا بسیط بودن، فاصله دار بودن یا بدون فاصله)</a:t>
+            </a:r>
+          </a:p>
+          <a:p>
+            <a:pPr marL="514350" indent="-514350" algn="r" rtl="1">
+              <a:buFont typeface="+mj-lt"/>
+              <a:buAutoNum type="arabicPeriod"/>
+            </a:pPr>
+            <a:r>
+              <a:rPr lang="fa-IR" dirty="0" smtClean="0">
+                <a:cs typeface="B Nazanin" panose="00000400000000000000" pitchFamily="2" charset="-78"/>
+              </a:rPr>
+              <a:t>لیست حروف اضافه را داریم این لیست شامل و نه محدود به (به، از، غیر، در، تا، الا، بر، حتی، را) میشود. در زمان تولید قالب جملات امکان اضافه و کم نمودن این لیست وجود دارد.</a:t>
+            </a:r>
+          </a:p>
+          <a:p>
+            <a:pPr marL="514350" indent="-514350" algn="r" rtl="1">
+              <a:buFont typeface="+mj-lt"/>
+              <a:buAutoNum type="arabicPeriod"/>
+            </a:pPr>
+            <a:r>
+              <a:rPr lang="fa-IR" dirty="0" smtClean="0">
+                <a:cs typeface="B Nazanin" panose="00000400000000000000" pitchFamily="2" charset="-78"/>
+              </a:rPr>
+              <a:t>اگر به کمک قالب گروههای اسمی جدا شوند مشکلی نداریم. در صورتیکه نتوانیم گروه های اسمی را با قالب استخراج کنیم، تمامی حالات را با داشتن احتمال آنها در نظر میگیریم. (استفاده از مدل زبانی -</a:t>
+            </a:r>
+            <a:r>
+              <a:rPr lang="en-US" dirty="0" err="1" smtClean="0">
+                <a:cs typeface="B Nazanin" panose="00000400000000000000" pitchFamily="2" charset="-78"/>
+              </a:rPr>
+              <a:t>ngrams</a:t>
+            </a:r>
+            <a:r>
+              <a:rPr lang="fa-IR" dirty="0" smtClean="0">
+                <a:cs typeface="B Nazanin" panose="00000400000000000000" pitchFamily="2" charset="-78"/>
+              </a:rPr>
+              <a:t>-)</a:t>
+            </a:r>
+          </a:p>
+          <a:p>
+            <a:pPr marL="514350" indent="-514350" algn="r" rtl="1">
+              <a:buFont typeface="+mj-lt"/>
+              <a:buAutoNum type="arabicPeriod"/>
+            </a:pPr>
+            <a:r>
+              <a:rPr lang="fa-IR" dirty="0" smtClean="0">
+                <a:cs typeface="B Nazanin" panose="00000400000000000000" pitchFamily="2" charset="-78"/>
+              </a:rPr>
+              <a:t>پس از ساخت قالب، یک کاربر انسانی لیست روابط قابل استخراج از آن قالب را تولید میکند.</a:t>
+            </a:r>
+          </a:p>
+          <a:p>
+            <a:pPr marL="514350" indent="-514350" algn="r" rtl="1">
+              <a:buFont typeface="+mj-lt"/>
+              <a:buAutoNum type="arabicPeriod"/>
+            </a:pPr>
+            <a:r>
+              <a:rPr lang="fa-IR" dirty="0" smtClean="0">
+                <a:cs typeface="B Nazanin" panose="00000400000000000000" pitchFamily="2" charset="-78"/>
+              </a:rPr>
+              <a:t>لیست روابط مستتر در هر قالب با توجه به بار معنایی حروف اضافه درون قالب گروه بندی میگردد.</a:t>
+            </a:r>
+          </a:p>
+          <a:p>
+            <a:pPr marL="514350" indent="-514350" algn="r" rtl="1">
+              <a:buFont typeface="+mj-lt"/>
+              <a:buAutoNum type="arabicPeriod"/>
+            </a:pPr>
+            <a:endParaRPr lang="fa-IR" dirty="0" smtClean="0">
+              <a:cs typeface="B Nazanin" panose="00000400000000000000" pitchFamily="2" charset="-78"/>
+            </a:endParaRPr>
+          </a:p>
+          <a:p>
+            <a:pPr marL="514350" indent="-514350" algn="r" rtl="1">
+              <a:buFont typeface="+mj-lt"/>
+              <a:buAutoNum type="arabicPeriod"/>
+            </a:pPr>
+            <a:endParaRPr lang="en-US" dirty="0">
+              <a:cs typeface="B Nazanin" panose="00000400000000000000" pitchFamily="2" charset="-78"/>
+            </a:endParaRPr>
+          </a:p>
+        </p:txBody>
+      </p:sp>
+    </p:spTree>
+    <p:extLst>
+      <p:ext uri="{BB962C8B-B14F-4D97-AF65-F5344CB8AC3E}">
+        <p14:creationId xmlns:p14="http://schemas.microsoft.com/office/powerpoint/2010/main" val="1098401548"/>
+      </p:ext>
+    </p:extLst>
+  </p:cSld>
+  <p:clrMapOvr>
+    <a:masterClrMapping/>
+  </p:clrMapOvr>
+  <p:timing>
+    <p:tnLst>
+      <p:par>
+        <p:cTn id="1" dur="indefinite" restart="never" nodeType="tmRoot"/>
+      </p:par>
+    </p:tnLst>
+  </p:timing>
+</p:sld>
+</file>
+
 <file path=ppt/slides/slide6.xml><?xml version="1.0" encoding="utf-8"?>
 <p:sld xmlns:a="http://schemas.openxmlformats.org/drawingml/2006/main" xmlns:r="http://schemas.openxmlformats.org/officeDocument/2006/relationships" xmlns:p="http://schemas.openxmlformats.org/presentationml/2006/main">
   <p:cSld>
@@ -3903,7 +3967,7 @@
               <a:rPr lang="fa-IR" b="1" dirty="0" smtClean="0">
                 <a:cs typeface="B Zar" panose="00000400000000000000" pitchFamily="2" charset="-78"/>
               </a:rPr>
-              <a:t>الگوریتم تولید قالب جمله</a:t>
+              <a:t>الگوریتم استخراج رابطه از قالب</a:t>
             </a:r>
             <a:endParaRPr lang="en-US" b="1" dirty="0">
               <a:cs typeface="B Zar" panose="00000400000000000000" pitchFamily="2" charset="-78"/>
@@ -3923,96 +3987,34 @@
         </p:nvSpPr>
         <p:spPr/>
         <p:txBody>
-          <a:bodyPr>
-            <a:normAutofit fontScale="92500"/>
-          </a:bodyPr>
-          <a:lstStyle/>
-          <a:p>
-            <a:pPr marL="514350" indent="-514350" algn="r" rtl="1">
-              <a:buFont typeface="+mj-lt"/>
-              <a:buAutoNum type="arabicPeriod"/>
-            </a:pPr>
+          <a:bodyPr/>
+          <a:lstStyle/>
+          <a:p>
+            <a:pPr algn="r" rtl="1"/>
             <a:r>
               <a:rPr lang="fa-IR" dirty="0" smtClean="0">
                 <a:cs typeface="B Nazanin" panose="00000400000000000000" pitchFamily="2" charset="-78"/>
               </a:rPr>
-              <a:t>تشخیص فعل جمله (کمکی بودن یا اصلی بودن، مرکب بودن یا بسیط بودن، فاصله دار بودن یا بدون فاصله)</a:t>
-            </a:r>
-          </a:p>
-          <a:p>
-            <a:pPr marL="514350" indent="-514350" algn="r" rtl="1">
-              <a:buFont typeface="+mj-lt"/>
-              <a:buAutoNum type="arabicPeriod"/>
-            </a:pPr>
+              <a:t>ابتدا قالب مناسب برای جمله یافته میشود. در صورت عدم موفقیت، قالب جمله با استفاده از الگوریتم اسلاید قبل استخراج شده و به بانک قالب افزوده میشود</a:t>
+            </a:r>
+          </a:p>
+          <a:p>
+            <a:pPr algn="r" rtl="1"/>
             <a:r>
               <a:rPr lang="fa-IR" dirty="0" smtClean="0">
                 <a:cs typeface="B Nazanin" panose="00000400000000000000" pitchFamily="2" charset="-78"/>
               </a:rPr>
-              <a:t>لیست حروف اضافه را داریم این لیست شامل و نه محدود به (به، از، غیر، در، تا، الا، بر، حتی، را) میشود. در زمان تولید قالب جملات امکان اضافه و کم نمودن این لیست وجود دارد.</a:t>
-            </a:r>
-          </a:p>
-          <a:p>
-            <a:pPr marL="514350" indent="-514350" algn="r" rtl="1">
-              <a:buFont typeface="+mj-lt"/>
-              <a:buAutoNum type="arabicPeriod"/>
-            </a:pPr>
+              <a:t>تعیین معنای حروف اضافه، (کمکی، شرطی، ...)</a:t>
+            </a:r>
+          </a:p>
+          <a:p>
+            <a:pPr algn="r" rtl="1"/>
             <a:r>
               <a:rPr lang="fa-IR" dirty="0" smtClean="0">
                 <a:cs typeface="B Nazanin" panose="00000400000000000000" pitchFamily="2" charset="-78"/>
               </a:rPr>
-              <a:t>اگر به کمک قالب گروههای اسمی جدا شوند مشکلی نداریم. در صورتیکه نتوانیم گروه های اسمی را با قالب استخراج کنیم، تمامی حالات را با داشتن احتمال آنها در نظر میگیریم. (استفاده از مدل زبانی -</a:t>
-            </a:r>
-            <a:r>
-              <a:rPr lang="en-US" dirty="0" err="1" smtClean="0">
-                <a:cs typeface="B Nazanin" panose="00000400000000000000" pitchFamily="2" charset="-78"/>
-              </a:rPr>
-              <a:t>ngrams</a:t>
-            </a:r>
-            <a:r>
-              <a:rPr lang="fa-IR" dirty="0" smtClean="0">
-                <a:cs typeface="B Nazanin" panose="00000400000000000000" pitchFamily="2" charset="-78"/>
-              </a:rPr>
-              <a:t>-)</a:t>
-            </a:r>
-          </a:p>
-          <a:p>
-            <a:pPr marL="514350" indent="-514350" algn="r" rtl="1">
-              <a:buFont typeface="+mj-lt"/>
-              <a:buAutoNum type="arabicPeriod"/>
-            </a:pPr>
-            <a:r>
-              <a:rPr lang="fa-IR" dirty="0" smtClean="0">
-                <a:cs typeface="B Nazanin" panose="00000400000000000000" pitchFamily="2" charset="-78"/>
-              </a:rPr>
-              <a:t>پس از ساخت قالب، یک کاربر انسانی لیست روابط قابل استخراج از آن قالب را تولید میکند.</a:t>
-            </a:r>
-          </a:p>
-          <a:p>
-            <a:pPr marL="514350" indent="-514350" algn="r" rtl="1">
-              <a:buFont typeface="+mj-lt"/>
-              <a:buAutoNum type="arabicPeriod"/>
-            </a:pPr>
-            <a:r>
-              <a:rPr lang="fa-IR" dirty="0" smtClean="0">
-                <a:cs typeface="B Nazanin" panose="00000400000000000000" pitchFamily="2" charset="-78"/>
-              </a:rPr>
-              <a:t>لیست روابط مستتر در هر قالب با توجه به بار معنایی حروف اضافه درون قالب گروه بندی میگردد.</a:t>
-            </a:r>
-          </a:p>
-          <a:p>
-            <a:pPr marL="514350" indent="-514350" algn="r" rtl="1">
-              <a:buFont typeface="+mj-lt"/>
-              <a:buAutoNum type="arabicPeriod"/>
-            </a:pPr>
-            <a:endParaRPr lang="fa-IR" dirty="0" smtClean="0">
-              <a:cs typeface="B Nazanin" panose="00000400000000000000" pitchFamily="2" charset="-78"/>
-            </a:endParaRPr>
-          </a:p>
-          <a:p>
-            <a:pPr marL="514350" indent="-514350" algn="r" rtl="1">
-              <a:buFont typeface="+mj-lt"/>
-              <a:buAutoNum type="arabicPeriod"/>
-            </a:pPr>
+              <a:t>با توجه به معانی حروف اضافه روابط متناسب با آن معنی از جمله استخراج میگردد.</a:t>
+            </a:r>
             <a:endParaRPr lang="en-US" dirty="0">
               <a:cs typeface="B Nazanin" panose="00000400000000000000" pitchFamily="2" charset="-78"/>
             </a:endParaRPr>
@@ -4022,7 +4024,7 @@
     </p:spTree>
     <p:extLst>
       <p:ext uri="{BB962C8B-B14F-4D97-AF65-F5344CB8AC3E}">
-        <p14:creationId xmlns:p14="http://schemas.microsoft.com/office/powerpoint/2010/main" val="1098401548"/>
+        <p14:creationId xmlns:p14="http://schemas.microsoft.com/office/powerpoint/2010/main" val="1342748039"/>
       </p:ext>
     </p:extLst>
   </p:cSld>
@@ -4076,7 +4078,7 @@
               <a:rPr lang="fa-IR" b="1" dirty="0" smtClean="0">
                 <a:cs typeface="B Zar" panose="00000400000000000000" pitchFamily="2" charset="-78"/>
               </a:rPr>
-              <a:t>الگوریتم استخراج رابطه از قالب</a:t>
+              <a:t>تعیین معنای حروف اضافه</a:t>
             </a:r>
             <a:endParaRPr lang="en-US" b="1" dirty="0">
               <a:cs typeface="B Zar" panose="00000400000000000000" pitchFamily="2" charset="-78"/>
@@ -4096,7 +4098,9 @@
         </p:nvSpPr>
         <p:spPr/>
         <p:txBody>
-          <a:bodyPr/>
+          <a:bodyPr>
+            <a:normAutofit fontScale="85000" lnSpcReduction="10000"/>
+          </a:bodyPr>
           <a:lstStyle/>
           <a:p>
             <a:pPr algn="r" rtl="1"/>
@@ -4104,7 +4108,34 @@
               <a:rPr lang="fa-IR" dirty="0" smtClean="0">
                 <a:cs typeface="B Nazanin" panose="00000400000000000000" pitchFamily="2" charset="-78"/>
               </a:rPr>
-              <a:t>ابتدا قالب مناسب برای جمله یافته میشود. در صورت عدم موفقیت، قالب جمله با استفاده از الگوریتم اسلاید قبل استخراج شده و به بانک قالب افزوده میشود</a:t>
+              <a:t>در جملات زیر به معانی متفاوت حرف اضافه «با» توجه کنید:</a:t>
+            </a:r>
+          </a:p>
+          <a:p>
+            <a:pPr lvl="1" algn="r" rtl="1"/>
+            <a:r>
+              <a:rPr lang="fa-IR" dirty="0" smtClean="0">
+                <a:cs typeface="B Nazanin" panose="00000400000000000000" pitchFamily="2" charset="-78"/>
+              </a:rPr>
+              <a:t>من با حسن آمدم.</a:t>
+            </a:r>
+          </a:p>
+          <a:p>
+            <a:pPr lvl="1" algn="r" rtl="1"/>
+            <a:r>
+              <a:rPr lang="fa-IR" dirty="0" smtClean="0">
+                <a:cs typeface="B Nazanin" panose="00000400000000000000" pitchFamily="2" charset="-78"/>
+              </a:rPr>
+              <a:t>من با ماشین آمدم.</a:t>
+            </a:r>
+          </a:p>
+          <a:p>
+            <a:pPr lvl="1" algn="r" rtl="1"/>
+            <a:r>
+              <a:rPr lang="fa-IR" dirty="0" smtClean="0">
+                <a:cs typeface="B Nazanin" panose="00000400000000000000" pitchFamily="2" charset="-78"/>
+              </a:rPr>
+              <a:t>من با ناراحتی آمدم.</a:t>
             </a:r>
           </a:p>
           <a:p>
@@ -4113,27 +4144,99 @@
               <a:rPr lang="fa-IR" dirty="0" smtClean="0">
                 <a:cs typeface="B Nazanin" panose="00000400000000000000" pitchFamily="2" charset="-78"/>
               </a:rPr>
-              <a:t>تعیین معنای حروف اضافه، (کمکی، شرطی، ...)</a:t>
-            </a:r>
-          </a:p>
-          <a:p>
-            <a:pPr algn="r" rtl="1"/>
+              <a:t>برای تعیین معنای حروف اضافه از یک دسته بندی کننده </a:t>
+            </a:r>
+            <a:r>
+              <a:rPr lang="fa-IR" sz="2000" dirty="0" smtClean="0">
+                <a:cs typeface="B Nazanin" panose="00000400000000000000" pitchFamily="2" charset="-78"/>
+              </a:rPr>
+              <a:t>(مانند </a:t>
+            </a:r>
+            <a:r>
+              <a:rPr lang="en-US" sz="2000" dirty="0" smtClean="0">
+                <a:cs typeface="B Nazanin" panose="00000400000000000000" pitchFamily="2" charset="-78"/>
+              </a:rPr>
+              <a:t>logistic regression</a:t>
+            </a:r>
+            <a:r>
+              <a:rPr lang="fa-IR" sz="2000" dirty="0" smtClean="0">
+                <a:cs typeface="B Nazanin" panose="00000400000000000000" pitchFamily="2" charset="-78"/>
+              </a:rPr>
+              <a:t> یا </a:t>
+            </a:r>
+            <a:r>
+              <a:rPr lang="en-US" sz="2000" dirty="0" smtClean="0">
+                <a:cs typeface="B Nazanin" panose="00000400000000000000" pitchFamily="2" charset="-78"/>
+              </a:rPr>
+              <a:t>CRF</a:t>
+            </a:r>
+            <a:r>
+              <a:rPr lang="fa-IR" sz="2000" dirty="0" smtClean="0">
+                <a:cs typeface="B Nazanin" panose="00000400000000000000" pitchFamily="2" charset="-78"/>
+              </a:rPr>
+              <a:t>)</a:t>
+            </a:r>
             <a:r>
               <a:rPr lang="fa-IR" dirty="0" smtClean="0">
                 <a:cs typeface="B Nazanin" panose="00000400000000000000" pitchFamily="2" charset="-78"/>
               </a:rPr>
-              <a:t>با توجه به معانی حروف اضافه روابط متناسب با آن معنی از جمله استخراج میگردد.</a:t>
-            </a:r>
-            <a:endParaRPr lang="en-US" dirty="0">
+              <a:t> استفاده میکنیم. برای اینکار از جمله، ویژگی استخراج میکنیم. شامل</a:t>
+            </a:r>
+          </a:p>
+          <a:p>
+            <a:pPr marL="914400" lvl="1" indent="-457200" algn="r" rtl="1">
+              <a:buFont typeface="+mj-lt"/>
+              <a:buAutoNum type="arabicPeriod"/>
+            </a:pPr>
+            <a:r>
+              <a:rPr lang="fa-IR" dirty="0" smtClean="0">
+                <a:cs typeface="B Nazanin" panose="00000400000000000000" pitchFamily="2" charset="-78"/>
+              </a:rPr>
+              <a:t>موجودیت های نامدار اطراف حرف اضافه</a:t>
+            </a:r>
+          </a:p>
+          <a:p>
+            <a:pPr marL="914400" lvl="1" indent="-457200" algn="r" rtl="1">
+              <a:buFont typeface="+mj-lt"/>
+              <a:buAutoNum type="arabicPeriod"/>
+            </a:pPr>
+            <a:r>
+              <a:rPr lang="fa-IR" dirty="0" smtClean="0">
+                <a:cs typeface="B Nazanin" panose="00000400000000000000" pitchFamily="2" charset="-78"/>
+              </a:rPr>
+              <a:t>نقش دستوری کلمات اطراف حروف اضافه</a:t>
+            </a:r>
+          </a:p>
+          <a:p>
+            <a:pPr marL="914400" lvl="1" indent="-457200" algn="r" rtl="1">
+              <a:buFont typeface="+mj-lt"/>
+              <a:buAutoNum type="arabicPeriod"/>
+            </a:pPr>
+            <a:r>
+              <a:rPr lang="fa-IR" dirty="0" smtClean="0">
+                <a:cs typeface="B Nazanin" panose="00000400000000000000" pitchFamily="2" charset="-78"/>
+              </a:rPr>
+              <a:t>خود کلمات </a:t>
+            </a:r>
+            <a:endParaRPr lang="fa-IR" dirty="0">
               <a:cs typeface="B Nazanin" panose="00000400000000000000" pitchFamily="2" charset="-78"/>
             </a:endParaRPr>
+          </a:p>
+          <a:p>
+            <a:pPr algn="r" rtl="1"/>
+            <a:r>
+              <a:rPr lang="fa-IR" dirty="0" smtClean="0">
+                <a:cs typeface="B Nazanin" panose="00000400000000000000" pitchFamily="2" charset="-78"/>
+              </a:rPr>
+              <a:t>برای هر حرف اضافه مجموعه معانی قابل برداشت از آن را داریم. یک از این معانی خروجی ماژول تعیین معنای حرف اضافه است.</a:t>
+            </a:r>
           </a:p>
         </p:txBody>
       </p:sp>
     </p:spTree>
     <p:extLst>
       <p:ext uri="{BB962C8B-B14F-4D97-AF65-F5344CB8AC3E}">
-        <p14:creationId xmlns:p14="http://schemas.microsoft.com/office/powerpoint/2010/main" val="1342748039"/>
+        <p14:creationId xmlns:p14="http://schemas.microsoft.com/office/powerpoint/2010/main" val="269892351"/>
       </p:ext>
     </p:extLst>
   </p:cSld>
@@ -4187,7 +4290,7 @@
               <a:rPr lang="fa-IR" b="1" dirty="0" smtClean="0">
                 <a:cs typeface="B Zar" panose="00000400000000000000" pitchFamily="2" charset="-78"/>
               </a:rPr>
-              <a:t>تعیین معنای حروف اضافه</a:t>
+              <a:t>ویژگی ها و مزایای روش پیشنهادی</a:t>
             </a:r>
             <a:endParaRPr lang="en-US" b="1" dirty="0">
               <a:cs typeface="B Zar" panose="00000400000000000000" pitchFamily="2" charset="-78"/>
@@ -4207,9 +4310,7 @@
         </p:nvSpPr>
         <p:spPr/>
         <p:txBody>
-          <a:bodyPr>
-            <a:normAutofit lnSpcReduction="10000"/>
-          </a:bodyPr>
+          <a:bodyPr/>
           <a:lstStyle/>
           <a:p>
             <a:pPr algn="r" rtl="1"/>
@@ -4217,135 +4318,66 @@
               <a:rPr lang="fa-IR" dirty="0" smtClean="0">
                 <a:cs typeface="B Nazanin" panose="00000400000000000000" pitchFamily="2" charset="-78"/>
               </a:rPr>
-              <a:t>در جملات زیر به معانی متفاوت حرف اضافه «با» توجه کنید:</a:t>
-            </a:r>
-          </a:p>
-          <a:p>
-            <a:pPr lvl="1" algn="r" rtl="1"/>
+              <a:t>فکر میکنیم در صورت تولید بانک قالب ها روی کل جمله، یک پارسر </a:t>
+            </a:r>
+            <a:r>
+              <a:rPr lang="en-US" dirty="0" smtClean="0">
+                <a:cs typeface="B Nazanin" panose="00000400000000000000" pitchFamily="2" charset="-78"/>
+              </a:rPr>
+              <a:t>top down</a:t>
+            </a:r>
             <a:r>
               <a:rPr lang="fa-IR" dirty="0" smtClean="0">
                 <a:cs typeface="B Nazanin" panose="00000400000000000000" pitchFamily="2" charset="-78"/>
               </a:rPr>
-              <a:t>من با حسن آمدم.</a:t>
-            </a:r>
-          </a:p>
-          <a:p>
-            <a:pPr lvl="1" algn="r" rtl="1"/>
+              <a:t> برای جمله خواهیم داشت.</a:t>
+            </a:r>
+          </a:p>
+          <a:p>
+            <a:pPr algn="r" rtl="1"/>
             <a:r>
               <a:rPr lang="fa-IR" dirty="0" smtClean="0">
                 <a:cs typeface="B Nazanin" panose="00000400000000000000" pitchFamily="2" charset="-78"/>
               </a:rPr>
-              <a:t>من با ماشین آمدم.</a:t>
-            </a:r>
-          </a:p>
-          <a:p>
-            <a:pPr lvl="1" algn="r" rtl="1"/>
+              <a:t>به کمک این قالبها میتوان گروههای اسمی درون جمله را استخراج کرد.</a:t>
+            </a:r>
+          </a:p>
+          <a:p>
+            <a:pPr algn="r" rtl="1"/>
             <a:r>
               <a:rPr lang="fa-IR" dirty="0" smtClean="0">
                 <a:cs typeface="B Nazanin" panose="00000400000000000000" pitchFamily="2" charset="-78"/>
               </a:rPr>
-              <a:t>من با ناراحتی آمدم.</a:t>
+              <a:t>روابط چندگانه درون جمله که دارای بیش از دو آرگومان است را میتوان استخراج کرد.</a:t>
             </a:r>
           </a:p>
           <a:p>
             <a:pPr algn="r" rtl="1"/>
             <a:r>
+              <a:rPr lang="fa-IR" smtClean="0">
+                <a:cs typeface="B Nazanin" panose="00000400000000000000" pitchFamily="2" charset="-78"/>
+              </a:rPr>
+              <a:t>با استفاده </a:t>
+            </a:r>
+            <a:r>
               <a:rPr lang="fa-IR" dirty="0" smtClean="0">
                 <a:cs typeface="B Nazanin" panose="00000400000000000000" pitchFamily="2" charset="-78"/>
               </a:rPr>
-              <a:t>برای تعیین معنای حروف اضافه از یک دسته بندی کننده </a:t>
-            </a:r>
-            <a:r>
-              <a:rPr lang="fa-IR" sz="2000" dirty="0" smtClean="0">
-                <a:cs typeface="B Nazanin" panose="00000400000000000000" pitchFamily="2" charset="-78"/>
-              </a:rPr>
-              <a:t>(مانند </a:t>
-            </a:r>
-            <a:r>
-              <a:rPr lang="en-US" sz="2000" dirty="0" smtClean="0">
-                <a:cs typeface="B Nazanin" panose="00000400000000000000" pitchFamily="2" charset="-78"/>
-              </a:rPr>
-              <a:t>logistic regression</a:t>
-            </a:r>
-            <a:r>
-              <a:rPr lang="fa-IR" sz="2000" dirty="0" smtClean="0">
-                <a:cs typeface="B Nazanin" panose="00000400000000000000" pitchFamily="2" charset="-78"/>
-              </a:rPr>
-              <a:t> یا </a:t>
-            </a:r>
-            <a:r>
-              <a:rPr lang="en-US" sz="2000" dirty="0" smtClean="0">
-                <a:cs typeface="B Nazanin" panose="00000400000000000000" pitchFamily="2" charset="-78"/>
-              </a:rPr>
-              <a:t>CRF</a:t>
-            </a:r>
-            <a:r>
-              <a:rPr lang="fa-IR" sz="2000" dirty="0" smtClean="0">
-                <a:cs typeface="B Nazanin" panose="00000400000000000000" pitchFamily="2" charset="-78"/>
-              </a:rPr>
-              <a:t>)</a:t>
-            </a:r>
-            <a:r>
-              <a:rPr lang="fa-IR" dirty="0" smtClean="0">
-                <a:cs typeface="B Nazanin" panose="00000400000000000000" pitchFamily="2" charset="-78"/>
-              </a:rPr>
-              <a:t> استفاده میکنیم. برای اینکار از جمله، ویژگی استخراج میکنیم. شامل</a:t>
-            </a:r>
-          </a:p>
-          <a:p>
-            <a:pPr marL="914400" lvl="1" indent="-457200" algn="r" rtl="1">
-              <a:buFont typeface="+mj-lt"/>
-              <a:buAutoNum type="arabicPeriod"/>
-            </a:pPr>
-            <a:r>
-              <a:rPr lang="fa-IR" dirty="0" smtClean="0">
-                <a:cs typeface="B Nazanin" panose="00000400000000000000" pitchFamily="2" charset="-78"/>
-              </a:rPr>
-              <a:t>موجودیت های نامدار اطراف حرف اضافه</a:t>
-            </a:r>
-          </a:p>
-          <a:p>
-            <a:pPr marL="914400" lvl="1" indent="-457200" algn="r" rtl="1">
-              <a:buFont typeface="+mj-lt"/>
-              <a:buAutoNum type="arabicPeriod"/>
-            </a:pPr>
-            <a:r>
-              <a:rPr lang="fa-IR" dirty="0" smtClean="0">
-                <a:cs typeface="B Nazanin" panose="00000400000000000000" pitchFamily="2" charset="-78"/>
-              </a:rPr>
-              <a:t>نقش دستوری کلمات اطراف حروف اضافه</a:t>
-            </a:r>
-          </a:p>
-          <a:p>
-            <a:pPr marL="914400" lvl="1" indent="-457200" algn="r" rtl="1">
-              <a:buFont typeface="+mj-lt"/>
-              <a:buAutoNum type="arabicPeriod"/>
-            </a:pPr>
-            <a:r>
-              <a:rPr lang="fa-IR" dirty="0" smtClean="0">
-                <a:cs typeface="B Nazanin" panose="00000400000000000000" pitchFamily="2" charset="-78"/>
-              </a:rPr>
-              <a:t>خود کلمات </a:t>
-            </a:r>
-            <a:endParaRPr lang="fa-IR" dirty="0">
+              <a:t>از یک آزمایش روی حدود صد جمله کوتاه فارسی نشان داده ایم که قالب ها در جملات تکرار میشوند. </a:t>
+            </a:r>
+          </a:p>
+          <a:p>
+            <a:pPr algn="r" rtl="1"/>
+            <a:endParaRPr lang="en-US" dirty="0">
               <a:cs typeface="B Nazanin" panose="00000400000000000000" pitchFamily="2" charset="-78"/>
             </a:endParaRPr>
-          </a:p>
-          <a:p>
-            <a:pPr algn="r" rtl="1"/>
-            <a:r>
-              <a:rPr lang="fa-IR" dirty="0" smtClean="0">
-                <a:cs typeface="B Nazanin" panose="00000400000000000000" pitchFamily="2" charset="-78"/>
-              </a:rPr>
-              <a:t>برای هر حرف اضافه مجموعه معانی قابل برداشت از آن را داریم. یک از این معانی خروجی ماژول تعیین معنای حرف اضافه است.</a:t>
-            </a:r>
           </a:p>
         </p:txBody>
       </p:sp>
     </p:spTree>
     <p:extLst>
       <p:ext uri="{BB962C8B-B14F-4D97-AF65-F5344CB8AC3E}">
-        <p14:creationId xmlns:p14="http://schemas.microsoft.com/office/powerpoint/2010/main" val="269892351"/>
+        <p14:creationId xmlns:p14="http://schemas.microsoft.com/office/powerpoint/2010/main" val="1027177853"/>
       </p:ext>
     </p:extLst>
   </p:cSld>

</xml_diff>

<commit_message>
thesis proposal continues ...
</commit_message>
<xml_diff>
--- a/my powerpoints/new idea in proposal.pptx
+++ b/my powerpoints/new idea in proposal.pptx
@@ -10,9 +10,11 @@
     <p:sldId id="258" r:id="rId4"/>
     <p:sldId id="259" r:id="rId5"/>
     <p:sldId id="260" r:id="rId6"/>
-    <p:sldId id="261" r:id="rId7"/>
-    <p:sldId id="262" r:id="rId8"/>
-    <p:sldId id="263" r:id="rId9"/>
+    <p:sldId id="265" r:id="rId7"/>
+    <p:sldId id="261" r:id="rId8"/>
+    <p:sldId id="262" r:id="rId9"/>
+    <p:sldId id="263" r:id="rId10"/>
+    <p:sldId id="264" r:id="rId11"/>
   </p:sldIdLst>
   <p:sldSz cx="12192000" cy="6858000"/>
   <p:notesSz cx="6858000" cy="9144000"/>
@@ -121,9 +123,11 @@
             <p14:sldId id="258"/>
             <p14:sldId id="259"/>
             <p14:sldId id="260"/>
+            <p14:sldId id="265"/>
             <p14:sldId id="261"/>
             <p14:sldId id="262"/>
             <p14:sldId id="263"/>
+            <p14:sldId id="264"/>
           </p14:sldIdLst>
         </p14:section>
       </p14:sectionLst>
@@ -266,7 +270,7 @@
           <a:p>
             <a:fld id="{8ED8215F-194B-4083-93C9-C472C7EF0176}" type="datetimeFigureOut">
               <a:rPr lang="en-US" smtClean="0"/>
-              <a:t>12/27/2014</a:t>
+              <a:t>12/28/2014</a:t>
             </a:fld>
             <a:endParaRPr lang="en-US"/>
           </a:p>
@@ -436,7 +440,7 @@
           <a:p>
             <a:fld id="{8ED8215F-194B-4083-93C9-C472C7EF0176}" type="datetimeFigureOut">
               <a:rPr lang="en-US" smtClean="0"/>
-              <a:t>12/27/2014</a:t>
+              <a:t>12/28/2014</a:t>
             </a:fld>
             <a:endParaRPr lang="en-US"/>
           </a:p>
@@ -616,7 +620,7 @@
           <a:p>
             <a:fld id="{8ED8215F-194B-4083-93C9-C472C7EF0176}" type="datetimeFigureOut">
               <a:rPr lang="en-US" smtClean="0"/>
-              <a:t>12/27/2014</a:t>
+              <a:t>12/28/2014</a:t>
             </a:fld>
             <a:endParaRPr lang="en-US"/>
           </a:p>
@@ -786,7 +790,7 @@
           <a:p>
             <a:fld id="{8ED8215F-194B-4083-93C9-C472C7EF0176}" type="datetimeFigureOut">
               <a:rPr lang="en-US" smtClean="0"/>
-              <a:t>12/27/2014</a:t>
+              <a:t>12/28/2014</a:t>
             </a:fld>
             <a:endParaRPr lang="en-US"/>
           </a:p>
@@ -1032,7 +1036,7 @@
           <a:p>
             <a:fld id="{8ED8215F-194B-4083-93C9-C472C7EF0176}" type="datetimeFigureOut">
               <a:rPr lang="en-US" smtClean="0"/>
-              <a:t>12/27/2014</a:t>
+              <a:t>12/28/2014</a:t>
             </a:fld>
             <a:endParaRPr lang="en-US"/>
           </a:p>
@@ -1264,7 +1268,7 @@
           <a:p>
             <a:fld id="{8ED8215F-194B-4083-93C9-C472C7EF0176}" type="datetimeFigureOut">
               <a:rPr lang="en-US" smtClean="0"/>
-              <a:t>12/27/2014</a:t>
+              <a:t>12/28/2014</a:t>
             </a:fld>
             <a:endParaRPr lang="en-US"/>
           </a:p>
@@ -1631,7 +1635,7 @@
           <a:p>
             <a:fld id="{8ED8215F-194B-4083-93C9-C472C7EF0176}" type="datetimeFigureOut">
               <a:rPr lang="en-US" smtClean="0"/>
-              <a:t>12/27/2014</a:t>
+              <a:t>12/28/2014</a:t>
             </a:fld>
             <a:endParaRPr lang="en-US"/>
           </a:p>
@@ -1749,7 +1753,7 @@
           <a:p>
             <a:fld id="{8ED8215F-194B-4083-93C9-C472C7EF0176}" type="datetimeFigureOut">
               <a:rPr lang="en-US" smtClean="0"/>
-              <a:t>12/27/2014</a:t>
+              <a:t>12/28/2014</a:t>
             </a:fld>
             <a:endParaRPr lang="en-US"/>
           </a:p>
@@ -1844,7 +1848,7 @@
           <a:p>
             <a:fld id="{8ED8215F-194B-4083-93C9-C472C7EF0176}" type="datetimeFigureOut">
               <a:rPr lang="en-US" smtClean="0"/>
-              <a:t>12/27/2014</a:t>
+              <a:t>12/28/2014</a:t>
             </a:fld>
             <a:endParaRPr lang="en-US"/>
           </a:p>
@@ -2121,7 +2125,7 @@
           <a:p>
             <a:fld id="{8ED8215F-194B-4083-93C9-C472C7EF0176}" type="datetimeFigureOut">
               <a:rPr lang="en-US" smtClean="0"/>
-              <a:t>12/27/2014</a:t>
+              <a:t>12/28/2014</a:t>
             </a:fld>
             <a:endParaRPr lang="en-US"/>
           </a:p>
@@ -2374,7 +2378,7 @@
           <a:p>
             <a:fld id="{8ED8215F-194B-4083-93C9-C472C7EF0176}" type="datetimeFigureOut">
               <a:rPr lang="en-US" smtClean="0"/>
-              <a:t>12/27/2014</a:t>
+              <a:t>12/28/2014</a:t>
             </a:fld>
             <a:endParaRPr lang="en-US"/>
           </a:p>
@@ -2587,7 +2591,7 @@
           <a:p>
             <a:fld id="{8ED8215F-194B-4083-93C9-C472C7EF0176}" type="datetimeFigureOut">
               <a:rPr lang="en-US" smtClean="0"/>
-              <a:t>12/27/2014</a:t>
+              <a:t>12/28/2014</a:t>
             </a:fld>
             <a:endParaRPr lang="en-US"/>
           </a:p>
@@ -3072,6 +3076,222 @@
 </p:sld>
 </file>
 
+<file path=ppt/slides/slide10.xml><?xml version="1.0" encoding="utf-8"?>
+<p:sld xmlns:a="http://schemas.openxmlformats.org/drawingml/2006/main" xmlns:r="http://schemas.openxmlformats.org/officeDocument/2006/relationships" xmlns:p="http://schemas.openxmlformats.org/presentationml/2006/main">
+  <p:cSld>
+    <p:spTree>
+      <p:nvGrpSpPr>
+        <p:cNvPr id="1" name=""/>
+        <p:cNvGrpSpPr/>
+        <p:nvPr/>
+      </p:nvGrpSpPr>
+      <p:grpSpPr>
+        <a:xfrm>
+          <a:off x="0" y="0"/>
+          <a:ext cx="0" cy="0"/>
+          <a:chOff x="0" y="0"/>
+          <a:chExt cx="0" cy="0"/>
+        </a:xfrm>
+      </p:grpSpPr>
+      <p:sp>
+        <p:nvSpPr>
+          <p:cNvPr id="2" name="Title 1"/>
+          <p:cNvSpPr>
+            <a:spLocks noGrp="1"/>
+          </p:cNvSpPr>
+          <p:nvPr>
+            <p:ph type="title"/>
+          </p:nvPr>
+        </p:nvSpPr>
+        <p:spPr/>
+        <p:txBody>
+          <a:bodyPr/>
+          <a:lstStyle/>
+          <a:p>
+            <a:pPr algn="ctr"/>
+            <a:r>
+              <a:rPr lang="fa-IR" b="1" dirty="0" smtClean="0">
+                <a:cs typeface="B Zar" panose="00000400000000000000" pitchFamily="2" charset="-78"/>
+              </a:rPr>
+              <a:t>نکات</a:t>
+            </a:r>
+            <a:endParaRPr lang="en-US" b="1" dirty="0">
+              <a:cs typeface="B Zar" panose="00000400000000000000" pitchFamily="2" charset="-78"/>
+            </a:endParaRPr>
+          </a:p>
+        </p:txBody>
+      </p:sp>
+      <p:sp>
+        <p:nvSpPr>
+          <p:cNvPr id="3" name="Content Placeholder 2"/>
+          <p:cNvSpPr>
+            <a:spLocks noGrp="1"/>
+          </p:cNvSpPr>
+          <p:nvPr>
+            <p:ph idx="1"/>
+          </p:nvPr>
+        </p:nvSpPr>
+        <p:spPr/>
+        <p:txBody>
+          <a:bodyPr>
+            <a:normAutofit lnSpcReduction="10000"/>
+          </a:bodyPr>
+          <a:lstStyle/>
+          <a:p>
+            <a:pPr algn="r" rtl="1"/>
+            <a:r>
+              <a:rPr lang="fa-IR" dirty="0" smtClean="0">
+                <a:cs typeface="B Nazanin" panose="00000400000000000000" pitchFamily="2" charset="-78"/>
+              </a:rPr>
+              <a:t>نیازمند یک تابع </a:t>
+            </a:r>
+            <a:r>
+              <a:rPr lang="en-US" dirty="0" smtClean="0">
+                <a:cs typeface="B Nazanin" panose="00000400000000000000" pitchFamily="2" charset="-78"/>
+              </a:rPr>
+              <a:t>confidence function</a:t>
+            </a:r>
+            <a:r>
+              <a:rPr lang="fa-IR" dirty="0" smtClean="0">
+                <a:cs typeface="B Nazanin" panose="00000400000000000000" pitchFamily="2" charset="-78"/>
+              </a:rPr>
+              <a:t> برای تعیین میزان اطمینان روی روابط تولیدی هستیم </a:t>
+            </a:r>
+          </a:p>
+          <a:p>
+            <a:pPr algn="r" rtl="1"/>
+            <a:r>
+              <a:rPr lang="fa-IR" dirty="0" smtClean="0">
+                <a:cs typeface="B Nazanin" panose="00000400000000000000" pitchFamily="2" charset="-78"/>
+              </a:rPr>
+              <a:t>برای تعیین قیود زمان و مکان به یک سیستم شناسایی موجودیت نامدار برای زبان فارسی نیازمندیم. همچنین در اختیار داشتن این سیستم به استخراج ویژگی برای تعیین معنای حروف اضافه کمک میکند.</a:t>
+            </a:r>
+          </a:p>
+          <a:p>
+            <a:pPr algn="r" rtl="1"/>
+            <a:r>
+              <a:rPr lang="fa-IR" dirty="0" smtClean="0">
+                <a:cs typeface="B Nazanin" panose="00000400000000000000" pitchFamily="2" charset="-78"/>
+              </a:rPr>
+              <a:t>نیازمند تولید پیکره مجموعه کلمات ساده فارسی برای تولید قالب جملات هستیم</a:t>
+            </a:r>
+          </a:p>
+          <a:p>
+            <a:pPr lvl="1" algn="r" rtl="1"/>
+            <a:r>
+              <a:rPr lang="fa-IR" dirty="0" smtClean="0">
+                <a:cs typeface="B Nazanin" panose="00000400000000000000" pitchFamily="2" charset="-78"/>
+              </a:rPr>
+              <a:t>برای اینکار دو روش مد نظر داریم. اولی خزشگر اینترنتی (زبان </a:t>
+            </a:r>
+            <a:r>
+              <a:rPr lang="en-US" dirty="0" smtClean="0">
+                <a:cs typeface="B Nazanin" panose="00000400000000000000" pitchFamily="2" charset="-78"/>
+              </a:rPr>
+              <a:t>PHP</a:t>
+            </a:r>
+            <a:r>
+              <a:rPr lang="fa-IR" dirty="0" smtClean="0">
+                <a:cs typeface="B Nazanin" panose="00000400000000000000" pitchFamily="2" charset="-78"/>
+              </a:rPr>
+              <a:t>) پیاده سازی کرده ایم که قالبیت استخراج جملات از روی سایت های اخبار کوتاه مانند </a:t>
+            </a:r>
+            <a:r>
+              <a:rPr lang="en-US" dirty="0">
+                <a:cs typeface="B Nazanin" panose="00000400000000000000" pitchFamily="2" charset="-78"/>
+                <a:hlinkClick r:id="rId2"/>
+              </a:rPr>
+              <a:t>http://</a:t>
+            </a:r>
+            <a:r>
+              <a:rPr lang="en-US" dirty="0" smtClean="0">
+                <a:cs typeface="B Nazanin" panose="00000400000000000000" pitchFamily="2" charset="-78"/>
+                <a:hlinkClick r:id="rId2"/>
+              </a:rPr>
+              <a:t>jamnews.ir/headlines</a:t>
+            </a:r>
+            <a:r>
+              <a:rPr lang="fa-IR" dirty="0" smtClean="0">
+                <a:cs typeface="B Nazanin" panose="00000400000000000000" pitchFamily="2" charset="-78"/>
+              </a:rPr>
+              <a:t> یا </a:t>
+            </a:r>
+            <a:r>
+              <a:rPr lang="en-US" dirty="0">
+                <a:cs typeface="B Nazanin" panose="00000400000000000000" pitchFamily="2" charset="-78"/>
+                <a:hlinkClick r:id="rId3"/>
+              </a:rPr>
+              <a:t>http://www.nasimonline.ir</a:t>
+            </a:r>
+            <a:r>
+              <a:rPr lang="en-US" dirty="0" smtClean="0">
+                <a:cs typeface="B Nazanin" panose="00000400000000000000" pitchFamily="2" charset="-78"/>
+                <a:hlinkClick r:id="rId3"/>
+              </a:rPr>
+              <a:t>/</a:t>
+            </a:r>
+            <a:r>
+              <a:rPr lang="fa-IR" dirty="0" smtClean="0">
+                <a:cs typeface="B Nazanin" panose="00000400000000000000" pitchFamily="2" charset="-78"/>
+              </a:rPr>
+              <a:t> را دارد. دومی استخراج همه جملات و شکاندن آنها به جملات ساده تر با استفاده از روش های موجود در زبان فارسی</a:t>
+            </a:r>
+          </a:p>
+          <a:p>
+            <a:pPr lvl="1" algn="r" rtl="1"/>
+            <a:r>
+              <a:rPr lang="fa-IR" dirty="0" smtClean="0">
+                <a:cs typeface="B Nazanin" panose="00000400000000000000" pitchFamily="2" charset="-78"/>
+              </a:rPr>
+              <a:t>میخواهیم کار خود را روی جملات خبری متمرکز کنیم. بنابراین سیستمی (زبان </a:t>
+            </a:r>
+            <a:r>
+              <a:rPr lang="en-US" dirty="0" smtClean="0">
+                <a:cs typeface="B Nazanin" panose="00000400000000000000" pitchFamily="2" charset="-78"/>
+              </a:rPr>
+              <a:t>Python</a:t>
+            </a:r>
+            <a:r>
+              <a:rPr lang="fa-IR" dirty="0" smtClean="0">
+                <a:cs typeface="B Nazanin" panose="00000400000000000000" pitchFamily="2" charset="-78"/>
+              </a:rPr>
+              <a:t>) برای تعیین ژانر جمله تهیه کرده ایم که از دسته بندی کننده نایو بیز استفاده میکند و دارای دقت بسیار خوبی است.</a:t>
+            </a:r>
+          </a:p>
+          <a:p>
+            <a:pPr lvl="1" algn="r" rtl="1"/>
+            <a:endParaRPr lang="fa-IR" dirty="0" smtClean="0">
+              <a:cs typeface="B Nazanin" panose="00000400000000000000" pitchFamily="2" charset="-78"/>
+            </a:endParaRPr>
+          </a:p>
+          <a:p>
+            <a:pPr algn="r" rtl="1"/>
+            <a:endParaRPr lang="en-US" dirty="0">
+              <a:cs typeface="B Nazanin" panose="00000400000000000000" pitchFamily="2" charset="-78"/>
+            </a:endParaRPr>
+          </a:p>
+        </p:txBody>
+      </p:sp>
+    </p:spTree>
+    <p:extLst>
+      <p:ext uri="{BB962C8B-B14F-4D97-AF65-F5344CB8AC3E}">
+        <p14:creationId xmlns:p14="http://schemas.microsoft.com/office/powerpoint/2010/main" val="1121746578"/>
+      </p:ext>
+    </p:extLst>
+  </p:cSld>
+  <p:clrMapOvr>
+    <a:masterClrMapping/>
+  </p:clrMapOvr>
+  <p:timing>
+    <p:tnLst>
+      <p:par>
+        <p:cTn id="1" dur="indefinite" restart="never" nodeType="tmRoot"/>
+      </p:par>
+    </p:tnLst>
+  </p:timing>
+</p:sld>
+</file>
+
 <file path=ppt/slides/slide2.xml><?xml version="1.0" encoding="utf-8"?>
 <p:sld xmlns:a="http://schemas.openxmlformats.org/drawingml/2006/main" xmlns:r="http://schemas.openxmlformats.org/officeDocument/2006/relationships" xmlns:p="http://schemas.openxmlformats.org/presentationml/2006/main">
   <p:cSld>
@@ -3162,7 +3382,7 @@
         </p:spPr>
         <p:txBody>
           <a:bodyPr>
-            <a:normAutofit fontScale="92500" lnSpcReduction="10000"/>
+            <a:normAutofit/>
           </a:bodyPr>
           <a:lstStyle/>
           <a:p>
@@ -3204,23 +3424,20 @@
               <a:rPr lang="fa-IR" dirty="0" smtClean="0">
                 <a:cs typeface="B Nazanin" panose="00000400000000000000" pitchFamily="2" charset="-78"/>
               </a:rPr>
-              <a:t>قالب های تعریف شده فقط بخشی از جمله را شامل </a:t>
+              <a:t>قالب های تعریف شده فقط بخشی از جمله را شامل میشوند (قالب </a:t>
             </a:r>
             <a:r>
               <a:rPr lang="fa-IR" dirty="0">
                 <a:cs typeface="B Nazanin" panose="00000400000000000000" pitchFamily="2" charset="-78"/>
               </a:rPr>
-              <a:t>میشوندمیشوند(قالب های تعریف شده محدود است ولی مال ما نامحدود</a:t>
-            </a:r>
-            <a:r>
-              <a:rPr lang="fa-IR" dirty="0" smtClean="0">
-                <a:cs typeface="B Nazanin" panose="00000400000000000000" pitchFamily="2" charset="-78"/>
-              </a:rPr>
-              <a:t>)</a:t>
-            </a:r>
-            <a:endParaRPr lang="fa-IR" dirty="0" smtClean="0">
-              <a:cs typeface="B Nazanin" panose="00000400000000000000" pitchFamily="2" charset="-78"/>
-            </a:endParaRPr>
+              <a:t>های تعریف شده محدود است ولی </a:t>
+            </a:r>
+            <a:r>
+              <a:rPr lang="fa-IR" dirty="0" smtClean="0">
+                <a:cs typeface="B Nazanin" panose="00000400000000000000" pitchFamily="2" charset="-78"/>
+              </a:rPr>
+              <a:t>در روش ارائه شده کل جمله را شامل میشود)</a:t>
+            </a:r>
           </a:p>
           <a:p>
             <a:pPr marL="514350" indent="-514350" algn="r" rtl="1">
@@ -3278,9 +3495,6 @@
               </a:rPr>
               <a:t>ساده صورت میگرفته است</a:t>
             </a:r>
-            <a:endParaRPr lang="fa-IR" dirty="0" smtClean="0">
-              <a:cs typeface="B Nazanin" panose="00000400000000000000" pitchFamily="2" charset="-78"/>
-            </a:endParaRPr>
           </a:p>
           <a:p>
             <a:pPr marL="514350" indent="-514350" algn="r" rtl="1">
@@ -3350,7 +3564,7 @@
               <a:rPr lang="fa-IR" b="1" dirty="0" smtClean="0">
                 <a:cs typeface="B Zar" panose="00000400000000000000" pitchFamily="2" charset="-78"/>
               </a:rPr>
-              <a:t>مراحل الگوریتم</a:t>
+              <a:t>مراحل اصلی الگوریتم</a:t>
             </a:r>
             <a:endParaRPr lang="en-US" dirty="0"/>
           </a:p>
@@ -3692,7 +3906,7 @@
           <a:graphicData uri="http://schemas.openxmlformats.org/presentationml/2006/ole">
             <mc:AlternateContent xmlns:mc="http://schemas.openxmlformats.org/markup-compatibility/2006">
               <mc:Choice xmlns:v="urn:schemas-microsoft-com:vml" Requires="v">
-                <p:oleObj spid="_x0000_s1083" name="Bitmap Image" r:id="rId3" imgW="5649114" imgH="7287642" progId="Paint.Picture">
+                <p:oleObj spid="_x0000_s1153" name="Bitmap Image" r:id="rId3" imgW="5649114" imgH="7287642" progId="Paint.Picture">
                   <p:embed/>
                 </p:oleObj>
               </mc:Choice>
@@ -3815,7 +4029,7 @@
         <p:spPr/>
         <p:txBody>
           <a:bodyPr>
-            <a:normAutofit fontScale="85000" lnSpcReduction="20000"/>
+            <a:normAutofit fontScale="70000" lnSpcReduction="20000"/>
           </a:bodyPr>
           <a:lstStyle/>
           <a:p>
@@ -3836,11 +4050,26 @@
               <a:buAutoNum type="arabicPeriod"/>
             </a:pPr>
             <a:r>
-              <a:rPr lang="fa-IR" dirty="0" smtClean="0">
-                <a:cs typeface="B Nazanin" panose="00000400000000000000" pitchFamily="2" charset="-78"/>
-              </a:rPr>
-              <a:t>لیست حروف اضافه را داریم این لیست شامل و نه محدود به (به، از، غیر، در، تا، الا، بر، حتی، را) میشود. در زمان تولید قالب جملات امکان اضافه و کم نمودن این لیست وجود دارد.</a:t>
-            </a:r>
+              <a:rPr lang="fa-IR" dirty="0">
+                <a:cs typeface="B Nazanin" panose="00000400000000000000" pitchFamily="2" charset="-78"/>
+              </a:rPr>
+              <a:t>فعل های کمکی مانند است و بود و شد در قالب باقی میمانند مگر اینکه ترکیب </a:t>
+            </a:r>
+            <a:r>
+              <a:rPr lang="fa-IR" dirty="0" smtClean="0">
+                <a:cs typeface="B Nazanin" panose="00000400000000000000" pitchFamily="2" charset="-78"/>
+              </a:rPr>
+              <a:t>شوند</a:t>
+            </a:r>
+            <a:r>
+              <a:rPr lang="fa-IR" dirty="0">
+                <a:cs typeface="B Nazanin" panose="00000400000000000000" pitchFamily="2" charset="-78"/>
+              </a:rPr>
+              <a:t>. </a:t>
+            </a:r>
+            <a:endParaRPr lang="fa-IR" dirty="0" smtClean="0">
+              <a:cs typeface="B Nazanin" panose="00000400000000000000" pitchFamily="2" charset="-78"/>
+            </a:endParaRPr>
           </a:p>
           <a:p>
             <a:pPr marL="514350" indent="-514350" algn="r" rtl="1">
@@ -3851,19 +4080,79 @@
               <a:rPr lang="fa-IR" dirty="0" smtClean="0">
                 <a:cs typeface="B Nazanin" panose="00000400000000000000" pitchFamily="2" charset="-78"/>
               </a:rPr>
-              <a:t>اگر به کمک قالب گروههای اسمی جدا شوند مشکلی نداریم. در صورتیکه نتوانیم گروه های اسمی را با قالب استخراج کنیم، تمامی حالات را با داشتن احتمال آنها در نظر میگیریم. (استفاده از مدل زبانی -</a:t>
-            </a:r>
-            <a:r>
-              <a:rPr lang="en-US" dirty="0" err="1" smtClean="0">
-                <a:cs typeface="B Nazanin" panose="00000400000000000000" pitchFamily="2" charset="-78"/>
-              </a:rPr>
-              <a:t>ngrams</a:t>
-            </a:r>
-            <a:r>
-              <a:rPr lang="fa-IR" dirty="0" smtClean="0">
-                <a:cs typeface="B Nazanin" panose="00000400000000000000" pitchFamily="2" charset="-78"/>
-              </a:rPr>
-              <a:t>-)</a:t>
+              <a:t>تمامی قیود و متمم های جمله مانند قید زمان، قید مکان، قید حالت و حالت تعلیل (برای) از اسکلت اصلی جمله جدا میشوند. همچنین لیست </a:t>
+            </a:r>
+            <a:r>
+              <a:rPr lang="fa-IR" dirty="0">
+                <a:cs typeface="B Nazanin" panose="00000400000000000000" pitchFamily="2" charset="-78"/>
+              </a:rPr>
+              <a:t>حروف اضافه را داریم این لیست شامل و نه محدود به (به، از، غیر، در، تا، الا، بر، حتی، را) میشود. در زمان تولید قالب جملات امکان اضافه و کم نمودن این لیست وجود دارد</a:t>
+            </a:r>
+            <a:r>
+              <a:rPr lang="fa-IR" dirty="0" smtClean="0">
+                <a:cs typeface="B Nazanin" panose="00000400000000000000" pitchFamily="2" charset="-78"/>
+              </a:rPr>
+              <a:t>. حروف اضافه به همراه گروه اسمی بعد از آنها از قالب حذف میشوند</a:t>
+            </a:r>
+          </a:p>
+          <a:p>
+            <a:pPr marL="514350" indent="-514350" algn="r" rtl="1">
+              <a:buFont typeface="+mj-lt"/>
+              <a:buAutoNum type="arabicPeriod"/>
+            </a:pPr>
+            <a:r>
+              <a:rPr lang="fa-IR" dirty="0" smtClean="0">
+                <a:cs typeface="B Nazanin" panose="00000400000000000000" pitchFamily="2" charset="-78"/>
+              </a:rPr>
+              <a:t>را و گروه اسمی قبل از آن در قالب باقی میماند. </a:t>
+            </a:r>
+          </a:p>
+          <a:p>
+            <a:pPr marL="514350" indent="-514350" algn="r" rtl="1">
+              <a:buFont typeface="+mj-lt"/>
+              <a:buAutoNum type="arabicPeriod"/>
+            </a:pPr>
+            <a:r>
+              <a:rPr lang="fa-IR" dirty="0" smtClean="0">
+                <a:cs typeface="B Nazanin" panose="00000400000000000000" pitchFamily="2" charset="-78"/>
+              </a:rPr>
+              <a:t>کلمات دارای معنای استلزامی در قالب میمانند مانند به معنای، دیگر همچون</a:t>
+            </a:r>
+          </a:p>
+          <a:p>
+            <a:pPr marL="514350" indent="-514350" algn="r" rtl="1">
+              <a:buFont typeface="+mj-lt"/>
+              <a:buAutoNum type="arabicPeriod"/>
+            </a:pPr>
+            <a:r>
+              <a:rPr lang="fa-IR" dirty="0" smtClean="0">
+                <a:cs typeface="B Nazanin" panose="00000400000000000000" pitchFamily="2" charset="-78"/>
+              </a:rPr>
+              <a:t>کلمات بیانگر حالت شرطی باقی میمانند. مانند اگر، چنانچه، درصورتیکه</a:t>
+            </a:r>
+          </a:p>
+          <a:p>
+            <a:pPr marL="514350" indent="-514350" algn="r" rtl="1">
+              <a:buFont typeface="+mj-lt"/>
+              <a:buAutoNum type="arabicPeriod"/>
+            </a:pPr>
+            <a:r>
+              <a:rPr lang="fa-IR" dirty="0" smtClean="0">
+                <a:cs typeface="B Nazanin" panose="00000400000000000000" pitchFamily="2" charset="-78"/>
+              </a:rPr>
+              <a:t>تاکیدات حذف میشوند. مانند بعید است، یقینا، حتما</a:t>
+            </a:r>
+          </a:p>
+          <a:p>
+            <a:pPr marL="514350" indent="-514350" algn="r" rtl="1">
+              <a:buFont typeface="+mj-lt"/>
+              <a:buAutoNum type="arabicPeriod"/>
+            </a:pPr>
+            <a:r>
+              <a:rPr lang="fa-IR" dirty="0" smtClean="0">
+                <a:cs typeface="B Nazanin" panose="00000400000000000000" pitchFamily="2" charset="-78"/>
+              </a:rPr>
+              <a:t>کلیه بخش هایی که حذف میشوند به مناسبترین جزء قالب به صورت عمودی اضافه میشوند. (یعنی نقش آنها باید مشخص شود)</a:t>
             </a:r>
           </a:p>
           <a:p>
@@ -3967,7 +4256,7 @@
               <a:rPr lang="fa-IR" b="1" dirty="0" smtClean="0">
                 <a:cs typeface="B Zar" panose="00000400000000000000" pitchFamily="2" charset="-78"/>
               </a:rPr>
-              <a:t>الگوریتم استخراج رابطه از قالب</a:t>
+              <a:t>چالشهای موجود</a:t>
             </a:r>
             <a:endParaRPr lang="en-US" b="1" dirty="0">
               <a:cs typeface="B Zar" panose="00000400000000000000" pitchFamily="2" charset="-78"/>
@@ -3995,7 +4284,28 @@
               <a:rPr lang="fa-IR" dirty="0" smtClean="0">
                 <a:cs typeface="B Nazanin" panose="00000400000000000000" pitchFamily="2" charset="-78"/>
               </a:rPr>
-              <a:t>ابتدا قالب مناسب برای جمله یافته میشود. در صورت عدم موفقیت، قالب جمله با استفاده از الگوریتم اسلاید قبل استخراج شده و به بانک قالب افزوده میشود</a:t>
+              <a:t>تعیین گروه های اسمی</a:t>
+            </a:r>
+          </a:p>
+          <a:p>
+            <a:pPr lvl="1" algn="r" rtl="1"/>
+            <a:r>
+              <a:rPr lang="fa-IR" dirty="0">
+                <a:cs typeface="B Nazanin" panose="00000400000000000000" pitchFamily="2" charset="-78"/>
+              </a:rPr>
+              <a:t>اگر به کمک قالب گروههای اسمی جدا شوند مشکلی نداریم. در صورتیکه نتوانیم گروه های اسمی را با قالب استخراج کنیم، تمامی حالات را با داشتن احتمال آنها در نظر میگیریم. (استفاده از مدل زبانی -</a:t>
+            </a:r>
+            <a:r>
+              <a:rPr lang="en-US" dirty="0" err="1">
+                <a:cs typeface="B Nazanin" panose="00000400000000000000" pitchFamily="2" charset="-78"/>
+              </a:rPr>
+              <a:t>ngrams</a:t>
+            </a:r>
+            <a:r>
+              <a:rPr lang="fa-IR" dirty="0">
+                <a:cs typeface="B Nazanin" panose="00000400000000000000" pitchFamily="2" charset="-78"/>
+              </a:rPr>
+              <a:t>-)</a:t>
             </a:r>
           </a:p>
           <a:p>
@@ -4004,16 +4314,16 @@
               <a:rPr lang="fa-IR" dirty="0" smtClean="0">
                 <a:cs typeface="B Nazanin" panose="00000400000000000000" pitchFamily="2" charset="-78"/>
               </a:rPr>
-              <a:t>تعیین معنای حروف اضافه، (کمکی، شرطی، ...)</a:t>
-            </a:r>
-          </a:p>
-          <a:p>
-            <a:pPr algn="r" rtl="1"/>
-            <a:r>
-              <a:rPr lang="fa-IR" dirty="0" smtClean="0">
-                <a:cs typeface="B Nazanin" panose="00000400000000000000" pitchFamily="2" charset="-78"/>
-              </a:rPr>
-              <a:t>با توجه به معانی حروف اضافه روابط متناسب با آن معنی از جمله استخراج میگردد.</a:t>
+              <a:t>محل و نحوه اتصال گروه های حذف شده</a:t>
+            </a:r>
+          </a:p>
+          <a:p>
+            <a:pPr lvl="1" algn="r" rtl="1"/>
+            <a:r>
+              <a:rPr lang="fa-IR" dirty="0" smtClean="0">
+                <a:cs typeface="B Nazanin" panose="00000400000000000000" pitchFamily="2" charset="-78"/>
+              </a:rPr>
+              <a:t>برخی از بخش های حذف شده به گروه اسمی قبل از خود یا به فعل جمله یا کل جمله پیوند میشوند.</a:t>
             </a:r>
             <a:endParaRPr lang="en-US" dirty="0">
               <a:cs typeface="B Nazanin" panose="00000400000000000000" pitchFamily="2" charset="-78"/>
@@ -4024,7 +4334,7 @@
     </p:spTree>
     <p:extLst>
       <p:ext uri="{BB962C8B-B14F-4D97-AF65-F5344CB8AC3E}">
-        <p14:creationId xmlns:p14="http://schemas.microsoft.com/office/powerpoint/2010/main" val="1342748039"/>
+        <p14:creationId xmlns:p14="http://schemas.microsoft.com/office/powerpoint/2010/main" val="3710720908"/>
       </p:ext>
     </p:extLst>
   </p:cSld>
@@ -4078,7 +4388,7 @@
               <a:rPr lang="fa-IR" b="1" dirty="0" smtClean="0">
                 <a:cs typeface="B Zar" panose="00000400000000000000" pitchFamily="2" charset="-78"/>
               </a:rPr>
-              <a:t>تعیین معنای حروف اضافه</a:t>
+              <a:t>الگوریتم استخراج رابطه از قالب</a:t>
             </a:r>
             <a:endParaRPr lang="en-US" b="1" dirty="0">
               <a:cs typeface="B Zar" panose="00000400000000000000" pitchFamily="2" charset="-78"/>
@@ -4098,9 +4408,7 @@
         </p:nvSpPr>
         <p:spPr/>
         <p:txBody>
-          <a:bodyPr>
-            <a:normAutofit fontScale="85000" lnSpcReduction="10000"/>
-          </a:bodyPr>
+          <a:bodyPr/>
           <a:lstStyle/>
           <a:p>
             <a:pPr algn="r" rtl="1"/>
@@ -4108,34 +4416,7 @@
               <a:rPr lang="fa-IR" dirty="0" smtClean="0">
                 <a:cs typeface="B Nazanin" panose="00000400000000000000" pitchFamily="2" charset="-78"/>
               </a:rPr>
-              <a:t>در جملات زیر به معانی متفاوت حرف اضافه «با» توجه کنید:</a:t>
-            </a:r>
-          </a:p>
-          <a:p>
-            <a:pPr lvl="1" algn="r" rtl="1"/>
-            <a:r>
-              <a:rPr lang="fa-IR" dirty="0" smtClean="0">
-                <a:cs typeface="B Nazanin" panose="00000400000000000000" pitchFamily="2" charset="-78"/>
-              </a:rPr>
-              <a:t>من با حسن آمدم.</a:t>
-            </a:r>
-          </a:p>
-          <a:p>
-            <a:pPr lvl="1" algn="r" rtl="1"/>
-            <a:r>
-              <a:rPr lang="fa-IR" dirty="0" smtClean="0">
-                <a:cs typeface="B Nazanin" panose="00000400000000000000" pitchFamily="2" charset="-78"/>
-              </a:rPr>
-              <a:t>من با ماشین آمدم.</a:t>
-            </a:r>
-          </a:p>
-          <a:p>
-            <a:pPr lvl="1" algn="r" rtl="1"/>
-            <a:r>
-              <a:rPr lang="fa-IR" dirty="0" smtClean="0">
-                <a:cs typeface="B Nazanin" panose="00000400000000000000" pitchFamily="2" charset="-78"/>
-              </a:rPr>
-              <a:t>من با ناراحتی آمدم.</a:t>
+              <a:t>ابتدا قالب مناسب برای جمله یافته میشود. در صورت عدم موفقیت، قالب جمله با استفاده از الگوریتم اسلاید قبل استخراج شده و به بانک قالب افزوده میشود</a:t>
             </a:r>
           </a:p>
           <a:p>
@@ -4144,99 +4425,27 @@
               <a:rPr lang="fa-IR" dirty="0" smtClean="0">
                 <a:cs typeface="B Nazanin" panose="00000400000000000000" pitchFamily="2" charset="-78"/>
               </a:rPr>
-              <a:t>برای تعیین معنای حروف اضافه از یک دسته بندی کننده </a:t>
-            </a:r>
-            <a:r>
-              <a:rPr lang="fa-IR" sz="2000" dirty="0" smtClean="0">
-                <a:cs typeface="B Nazanin" panose="00000400000000000000" pitchFamily="2" charset="-78"/>
-              </a:rPr>
-              <a:t>(مانند </a:t>
-            </a:r>
-            <a:r>
-              <a:rPr lang="en-US" sz="2000" dirty="0" smtClean="0">
-                <a:cs typeface="B Nazanin" panose="00000400000000000000" pitchFamily="2" charset="-78"/>
-              </a:rPr>
-              <a:t>logistic regression</a:t>
-            </a:r>
-            <a:r>
-              <a:rPr lang="fa-IR" sz="2000" dirty="0" smtClean="0">
-                <a:cs typeface="B Nazanin" panose="00000400000000000000" pitchFamily="2" charset="-78"/>
-              </a:rPr>
-              <a:t> یا </a:t>
-            </a:r>
-            <a:r>
-              <a:rPr lang="en-US" sz="2000" dirty="0" smtClean="0">
-                <a:cs typeface="B Nazanin" panose="00000400000000000000" pitchFamily="2" charset="-78"/>
-              </a:rPr>
-              <a:t>CRF</a:t>
-            </a:r>
-            <a:r>
-              <a:rPr lang="fa-IR" sz="2000" dirty="0" smtClean="0">
-                <a:cs typeface="B Nazanin" panose="00000400000000000000" pitchFamily="2" charset="-78"/>
-              </a:rPr>
-              <a:t>)</a:t>
-            </a:r>
-            <a:r>
-              <a:rPr lang="fa-IR" dirty="0" smtClean="0">
-                <a:cs typeface="B Nazanin" panose="00000400000000000000" pitchFamily="2" charset="-78"/>
-              </a:rPr>
-              <a:t> استفاده میکنیم. برای اینکار از جمله، ویژگی استخراج میکنیم. شامل</a:t>
-            </a:r>
-          </a:p>
-          <a:p>
-            <a:pPr marL="914400" lvl="1" indent="-457200" algn="r" rtl="1">
-              <a:buFont typeface="+mj-lt"/>
-              <a:buAutoNum type="arabicPeriod"/>
-            </a:pPr>
-            <a:r>
-              <a:rPr lang="fa-IR" dirty="0" smtClean="0">
-                <a:cs typeface="B Nazanin" panose="00000400000000000000" pitchFamily="2" charset="-78"/>
-              </a:rPr>
-              <a:t>موجودیت های نامدار اطراف حرف اضافه</a:t>
-            </a:r>
-          </a:p>
-          <a:p>
-            <a:pPr marL="914400" lvl="1" indent="-457200" algn="r" rtl="1">
-              <a:buFont typeface="+mj-lt"/>
-              <a:buAutoNum type="arabicPeriod"/>
-            </a:pPr>
-            <a:r>
-              <a:rPr lang="fa-IR" dirty="0" smtClean="0">
-                <a:cs typeface="B Nazanin" panose="00000400000000000000" pitchFamily="2" charset="-78"/>
-              </a:rPr>
-              <a:t>نقش دستوری کلمات اطراف حروف اضافه</a:t>
-            </a:r>
-          </a:p>
-          <a:p>
-            <a:pPr marL="914400" lvl="1" indent="-457200" algn="r" rtl="1">
-              <a:buFont typeface="+mj-lt"/>
-              <a:buAutoNum type="arabicPeriod"/>
-            </a:pPr>
-            <a:r>
-              <a:rPr lang="fa-IR" dirty="0" smtClean="0">
-                <a:cs typeface="B Nazanin" panose="00000400000000000000" pitchFamily="2" charset="-78"/>
-              </a:rPr>
-              <a:t>خود کلمات </a:t>
-            </a:r>
-            <a:endParaRPr lang="fa-IR" dirty="0">
+              <a:t>تعیین معنای حروف اضافه، (کمکی، شرطی، ...)</a:t>
+            </a:r>
+          </a:p>
+          <a:p>
+            <a:pPr algn="r" rtl="1"/>
+            <a:r>
+              <a:rPr lang="fa-IR" dirty="0" smtClean="0">
+                <a:cs typeface="B Nazanin" panose="00000400000000000000" pitchFamily="2" charset="-78"/>
+              </a:rPr>
+              <a:t>با توجه به معانی حروف اضافه روابط متناسب با آن معنی از جمله استخراج میگردد.</a:t>
+            </a:r>
+            <a:endParaRPr lang="en-US" dirty="0">
               <a:cs typeface="B Nazanin" panose="00000400000000000000" pitchFamily="2" charset="-78"/>
             </a:endParaRPr>
-          </a:p>
-          <a:p>
-            <a:pPr algn="r" rtl="1"/>
-            <a:r>
-              <a:rPr lang="fa-IR" dirty="0" smtClean="0">
-                <a:cs typeface="B Nazanin" panose="00000400000000000000" pitchFamily="2" charset="-78"/>
-              </a:rPr>
-              <a:t>برای هر حرف اضافه مجموعه معانی قابل برداشت از آن را داریم. یک از این معانی خروجی ماژول تعیین معنای حرف اضافه است.</a:t>
-            </a:r>
           </a:p>
         </p:txBody>
       </p:sp>
     </p:spTree>
     <p:extLst>
       <p:ext uri="{BB962C8B-B14F-4D97-AF65-F5344CB8AC3E}">
-        <p14:creationId xmlns:p14="http://schemas.microsoft.com/office/powerpoint/2010/main" val="269892351"/>
+        <p14:creationId xmlns:p14="http://schemas.microsoft.com/office/powerpoint/2010/main" val="1342748039"/>
       </p:ext>
     </p:extLst>
   </p:cSld>
@@ -4290,7 +4499,7 @@
               <a:rPr lang="fa-IR" b="1" dirty="0" smtClean="0">
                 <a:cs typeface="B Zar" panose="00000400000000000000" pitchFamily="2" charset="-78"/>
               </a:rPr>
-              <a:t>ویژگی ها و مزایای روش پیشنهادی</a:t>
+              <a:t>تعیین معنای حروف اضافه</a:t>
             </a:r>
             <a:endParaRPr lang="en-US" b="1" dirty="0">
               <a:cs typeface="B Zar" panose="00000400000000000000" pitchFamily="2" charset="-78"/>
@@ -4310,7 +4519,9 @@
         </p:nvSpPr>
         <p:spPr/>
         <p:txBody>
-          <a:bodyPr/>
+          <a:bodyPr>
+            <a:normAutofit lnSpcReduction="10000"/>
+          </a:bodyPr>
           <a:lstStyle/>
           <a:p>
             <a:pPr algn="r" rtl="1"/>
@@ -4318,6 +4529,216 @@
               <a:rPr lang="fa-IR" dirty="0" smtClean="0">
                 <a:cs typeface="B Nazanin" panose="00000400000000000000" pitchFamily="2" charset="-78"/>
               </a:rPr>
+              <a:t>در جملات زیر به معانی متفاوت حرف اضافه «با» توجه کنید:</a:t>
+            </a:r>
+          </a:p>
+          <a:p>
+            <a:pPr lvl="1" algn="r" rtl="1"/>
+            <a:r>
+              <a:rPr lang="fa-IR" dirty="0" smtClean="0">
+                <a:cs typeface="B Nazanin" panose="00000400000000000000" pitchFamily="2" charset="-78"/>
+              </a:rPr>
+              <a:t>من با حسن آمدم.</a:t>
+            </a:r>
+          </a:p>
+          <a:p>
+            <a:pPr lvl="1" algn="r" rtl="1"/>
+            <a:r>
+              <a:rPr lang="fa-IR" dirty="0" smtClean="0">
+                <a:cs typeface="B Nazanin" panose="00000400000000000000" pitchFamily="2" charset="-78"/>
+              </a:rPr>
+              <a:t>من با ماشین آمدم.</a:t>
+            </a:r>
+          </a:p>
+          <a:p>
+            <a:pPr lvl="1" algn="r" rtl="1"/>
+            <a:r>
+              <a:rPr lang="fa-IR" dirty="0" smtClean="0">
+                <a:cs typeface="B Nazanin" panose="00000400000000000000" pitchFamily="2" charset="-78"/>
+              </a:rPr>
+              <a:t>من با ناراحتی آمدم.</a:t>
+            </a:r>
+          </a:p>
+          <a:p>
+            <a:pPr algn="r" rtl="1"/>
+            <a:r>
+              <a:rPr lang="fa-IR" dirty="0" smtClean="0">
+                <a:cs typeface="B Nazanin" panose="00000400000000000000" pitchFamily="2" charset="-78"/>
+              </a:rPr>
+              <a:t>برای تعیین معنای حروف اضافه از یک دسته بندی کننده </a:t>
+            </a:r>
+            <a:r>
+              <a:rPr lang="fa-IR" sz="2000" dirty="0" smtClean="0">
+                <a:cs typeface="B Nazanin" panose="00000400000000000000" pitchFamily="2" charset="-78"/>
+              </a:rPr>
+              <a:t>(مانند </a:t>
+            </a:r>
+            <a:r>
+              <a:rPr lang="en-US" sz="2000" dirty="0" smtClean="0">
+                <a:cs typeface="B Nazanin" panose="00000400000000000000" pitchFamily="2" charset="-78"/>
+              </a:rPr>
+              <a:t>logistic regression</a:t>
+            </a:r>
+            <a:r>
+              <a:rPr lang="fa-IR" sz="2000" dirty="0" smtClean="0">
+                <a:cs typeface="B Nazanin" panose="00000400000000000000" pitchFamily="2" charset="-78"/>
+              </a:rPr>
+              <a:t> یا </a:t>
+            </a:r>
+            <a:r>
+              <a:rPr lang="en-US" sz="2000" dirty="0" smtClean="0">
+                <a:cs typeface="B Nazanin" panose="00000400000000000000" pitchFamily="2" charset="-78"/>
+              </a:rPr>
+              <a:t>CRF</a:t>
+            </a:r>
+            <a:r>
+              <a:rPr lang="fa-IR" sz="2000" dirty="0" smtClean="0">
+                <a:cs typeface="B Nazanin" panose="00000400000000000000" pitchFamily="2" charset="-78"/>
+              </a:rPr>
+              <a:t>)</a:t>
+            </a:r>
+            <a:r>
+              <a:rPr lang="fa-IR" dirty="0" smtClean="0">
+                <a:cs typeface="B Nazanin" panose="00000400000000000000" pitchFamily="2" charset="-78"/>
+              </a:rPr>
+              <a:t> استفاده میکنیم. برای اینکار از جمله، ویژگی استخراج میکنیم. شامل</a:t>
+            </a:r>
+          </a:p>
+          <a:p>
+            <a:pPr marL="914400" lvl="1" indent="-457200" algn="r" rtl="1">
+              <a:buFont typeface="+mj-lt"/>
+              <a:buAutoNum type="arabicPeriod"/>
+            </a:pPr>
+            <a:r>
+              <a:rPr lang="fa-IR" dirty="0" smtClean="0">
+                <a:cs typeface="B Nazanin" panose="00000400000000000000" pitchFamily="2" charset="-78"/>
+              </a:rPr>
+              <a:t>موجودیت های نامدار اطراف حرف اضافه</a:t>
+            </a:r>
+          </a:p>
+          <a:p>
+            <a:pPr marL="914400" lvl="1" indent="-457200" algn="r" rtl="1">
+              <a:buFont typeface="+mj-lt"/>
+              <a:buAutoNum type="arabicPeriod"/>
+            </a:pPr>
+            <a:r>
+              <a:rPr lang="fa-IR" dirty="0" smtClean="0">
+                <a:cs typeface="B Nazanin" panose="00000400000000000000" pitchFamily="2" charset="-78"/>
+              </a:rPr>
+              <a:t>نقش دستوری کلمات اطراف حروف اضافه</a:t>
+            </a:r>
+          </a:p>
+          <a:p>
+            <a:pPr marL="914400" lvl="1" indent="-457200" algn="r" rtl="1">
+              <a:buFont typeface="+mj-lt"/>
+              <a:buAutoNum type="arabicPeriod"/>
+            </a:pPr>
+            <a:r>
+              <a:rPr lang="fa-IR" dirty="0" smtClean="0">
+                <a:cs typeface="B Nazanin" panose="00000400000000000000" pitchFamily="2" charset="-78"/>
+              </a:rPr>
+              <a:t>خود کلمات </a:t>
+            </a:r>
+            <a:endParaRPr lang="fa-IR" dirty="0">
+              <a:cs typeface="B Nazanin" panose="00000400000000000000" pitchFamily="2" charset="-78"/>
+            </a:endParaRPr>
+          </a:p>
+          <a:p>
+            <a:pPr algn="r" rtl="1"/>
+            <a:r>
+              <a:rPr lang="fa-IR" dirty="0" smtClean="0">
+                <a:cs typeface="B Nazanin" panose="00000400000000000000" pitchFamily="2" charset="-78"/>
+              </a:rPr>
+              <a:t>برای هر حرف اضافه مجموعه معانی قابل برداشت از آن را داریم. یک از این معانی خروجی ماژول تعیین معنای حرف اضافه است.</a:t>
+            </a:r>
+          </a:p>
+        </p:txBody>
+      </p:sp>
+    </p:spTree>
+    <p:extLst>
+      <p:ext uri="{BB962C8B-B14F-4D97-AF65-F5344CB8AC3E}">
+        <p14:creationId xmlns:p14="http://schemas.microsoft.com/office/powerpoint/2010/main" val="269892351"/>
+      </p:ext>
+    </p:extLst>
+  </p:cSld>
+  <p:clrMapOvr>
+    <a:masterClrMapping/>
+  </p:clrMapOvr>
+  <p:timing>
+    <p:tnLst>
+      <p:par>
+        <p:cTn id="1" dur="indefinite" restart="never" nodeType="tmRoot"/>
+      </p:par>
+    </p:tnLst>
+  </p:timing>
+</p:sld>
+</file>
+
+<file path=ppt/slides/slide9.xml><?xml version="1.0" encoding="utf-8"?>
+<p:sld xmlns:a="http://schemas.openxmlformats.org/drawingml/2006/main" xmlns:r="http://schemas.openxmlformats.org/officeDocument/2006/relationships" xmlns:p="http://schemas.openxmlformats.org/presentationml/2006/main">
+  <p:cSld>
+    <p:spTree>
+      <p:nvGrpSpPr>
+        <p:cNvPr id="1" name=""/>
+        <p:cNvGrpSpPr/>
+        <p:nvPr/>
+      </p:nvGrpSpPr>
+      <p:grpSpPr>
+        <a:xfrm>
+          <a:off x="0" y="0"/>
+          <a:ext cx="0" cy="0"/>
+          <a:chOff x="0" y="0"/>
+          <a:chExt cx="0" cy="0"/>
+        </a:xfrm>
+      </p:grpSpPr>
+      <p:sp>
+        <p:nvSpPr>
+          <p:cNvPr id="2" name="Title 1"/>
+          <p:cNvSpPr>
+            <a:spLocks noGrp="1"/>
+          </p:cNvSpPr>
+          <p:nvPr>
+            <p:ph type="title"/>
+          </p:nvPr>
+        </p:nvSpPr>
+        <p:spPr/>
+        <p:txBody>
+          <a:bodyPr/>
+          <a:lstStyle/>
+          <a:p>
+            <a:pPr algn="ctr"/>
+            <a:r>
+              <a:rPr lang="fa-IR" b="1" dirty="0" smtClean="0">
+                <a:cs typeface="B Zar" panose="00000400000000000000" pitchFamily="2" charset="-78"/>
+              </a:rPr>
+              <a:t>ویژگی ها و مزایای روش پیشنهادی</a:t>
+            </a:r>
+            <a:endParaRPr lang="en-US" b="1" dirty="0">
+              <a:cs typeface="B Zar" panose="00000400000000000000" pitchFamily="2" charset="-78"/>
+            </a:endParaRPr>
+          </a:p>
+        </p:txBody>
+      </p:sp>
+      <p:sp>
+        <p:nvSpPr>
+          <p:cNvPr id="3" name="Content Placeholder 2"/>
+          <p:cNvSpPr>
+            <a:spLocks noGrp="1"/>
+          </p:cNvSpPr>
+          <p:nvPr>
+            <p:ph idx="1"/>
+          </p:nvPr>
+        </p:nvSpPr>
+        <p:spPr/>
+        <p:txBody>
+          <a:bodyPr/>
+          <a:lstStyle/>
+          <a:p>
+            <a:pPr algn="r" rtl="1"/>
+            <a:r>
+              <a:rPr lang="fa-IR" dirty="0" smtClean="0">
+                <a:cs typeface="B Nazanin" panose="00000400000000000000" pitchFamily="2" charset="-78"/>
+              </a:rPr>
               <a:t>فکر میکنیم در صورت تولید بانک قالب ها روی کل جمله، یک پارسر </a:t>
             </a:r>
             <a:r>
@@ -4354,17 +4775,44 @@
           <a:p>
             <a:pPr algn="r" rtl="1"/>
             <a:r>
+              <a:rPr lang="fa-IR" dirty="0" smtClean="0">
+                <a:cs typeface="B Nazanin" panose="00000400000000000000" pitchFamily="2" charset="-78"/>
+              </a:rPr>
+              <a:t>با استفاده </a:t>
+            </a:r>
+            <a:r>
+              <a:rPr lang="fa-IR" dirty="0">
+                <a:cs typeface="B Nazanin" panose="00000400000000000000" pitchFamily="2" charset="-78"/>
+              </a:rPr>
+              <a:t>از یک آزمایش روی حدود صد جمله کوتاه فارسی نشان داده ایم که قالب ها در جملات تکرار میشوند. </a:t>
+            </a:r>
+            <a:endParaRPr lang="fa-IR" dirty="0" smtClean="0">
+              <a:cs typeface="B Nazanin" panose="00000400000000000000" pitchFamily="2" charset="-78"/>
+            </a:endParaRPr>
+          </a:p>
+          <a:p>
+            <a:pPr algn="r" rtl="1"/>
+            <a:r>
+              <a:rPr lang="fa-IR" dirty="0" smtClean="0">
+                <a:cs typeface="B Nazanin" panose="00000400000000000000" pitchFamily="2" charset="-78"/>
+              </a:rPr>
+              <a:t>الگوریتم پیشنهادی نیازمند داده آموزشی برچسب خورده یا لیست روابط از قبل نیست</a:t>
+            </a:r>
+            <a:r>
               <a:rPr lang="fa-IR" smtClean="0">
                 <a:cs typeface="B Nazanin" panose="00000400000000000000" pitchFamily="2" charset="-78"/>
               </a:rPr>
-              <a:t>با استفاده </a:t>
-            </a:r>
-            <a:r>
-              <a:rPr lang="fa-IR" dirty="0" smtClean="0">
-                <a:cs typeface="B Nazanin" panose="00000400000000000000" pitchFamily="2" charset="-78"/>
-              </a:rPr>
-              <a:t>از یک آزمایش روی حدود صد جمله کوتاه فارسی نشان داده ایم که قالب ها در جملات تکرار میشوند. </a:t>
-            </a:r>
+              <a:t>. </a:t>
+            </a:r>
+            <a:endParaRPr lang="fa-IR" dirty="0">
+              <a:cs typeface="B Nazanin" panose="00000400000000000000" pitchFamily="2" charset="-78"/>
+            </a:endParaRPr>
+          </a:p>
+          <a:p>
+            <a:pPr algn="r" rtl="1"/>
+            <a:endParaRPr lang="fa-IR" dirty="0" smtClean="0">
+              <a:cs typeface="B Nazanin" panose="00000400000000000000" pitchFamily="2" charset="-78"/>
+            </a:endParaRPr>
           </a:p>
           <a:p>
             <a:pPr algn="r" rtl="1"/>

</xml_diff>

<commit_message>
proposal almost is complete if god wants.
</commit_message>
<xml_diff>
--- a/my powerpoints/new idea in proposal.pptx
+++ b/my powerpoints/new idea in proposal.pptx
@@ -270,7 +270,7 @@
           <a:p>
             <a:fld id="{8ED8215F-194B-4083-93C9-C472C7EF0176}" type="datetimeFigureOut">
               <a:rPr lang="en-US" smtClean="0"/>
-              <a:t>12/28/2014</a:t>
+              <a:t>12/29/2014</a:t>
             </a:fld>
             <a:endParaRPr lang="en-US"/>
           </a:p>
@@ -440,7 +440,7 @@
           <a:p>
             <a:fld id="{8ED8215F-194B-4083-93C9-C472C7EF0176}" type="datetimeFigureOut">
               <a:rPr lang="en-US" smtClean="0"/>
-              <a:t>12/28/2014</a:t>
+              <a:t>12/29/2014</a:t>
             </a:fld>
             <a:endParaRPr lang="en-US"/>
           </a:p>
@@ -620,7 +620,7 @@
           <a:p>
             <a:fld id="{8ED8215F-194B-4083-93C9-C472C7EF0176}" type="datetimeFigureOut">
               <a:rPr lang="en-US" smtClean="0"/>
-              <a:t>12/28/2014</a:t>
+              <a:t>12/29/2014</a:t>
             </a:fld>
             <a:endParaRPr lang="en-US"/>
           </a:p>
@@ -790,7 +790,7 @@
           <a:p>
             <a:fld id="{8ED8215F-194B-4083-93C9-C472C7EF0176}" type="datetimeFigureOut">
               <a:rPr lang="en-US" smtClean="0"/>
-              <a:t>12/28/2014</a:t>
+              <a:t>12/29/2014</a:t>
             </a:fld>
             <a:endParaRPr lang="en-US"/>
           </a:p>
@@ -1036,7 +1036,7 @@
           <a:p>
             <a:fld id="{8ED8215F-194B-4083-93C9-C472C7EF0176}" type="datetimeFigureOut">
               <a:rPr lang="en-US" smtClean="0"/>
-              <a:t>12/28/2014</a:t>
+              <a:t>12/29/2014</a:t>
             </a:fld>
             <a:endParaRPr lang="en-US"/>
           </a:p>
@@ -1268,7 +1268,7 @@
           <a:p>
             <a:fld id="{8ED8215F-194B-4083-93C9-C472C7EF0176}" type="datetimeFigureOut">
               <a:rPr lang="en-US" smtClean="0"/>
-              <a:t>12/28/2014</a:t>
+              <a:t>12/29/2014</a:t>
             </a:fld>
             <a:endParaRPr lang="en-US"/>
           </a:p>
@@ -1635,7 +1635,7 @@
           <a:p>
             <a:fld id="{8ED8215F-194B-4083-93C9-C472C7EF0176}" type="datetimeFigureOut">
               <a:rPr lang="en-US" smtClean="0"/>
-              <a:t>12/28/2014</a:t>
+              <a:t>12/29/2014</a:t>
             </a:fld>
             <a:endParaRPr lang="en-US"/>
           </a:p>
@@ -1753,7 +1753,7 @@
           <a:p>
             <a:fld id="{8ED8215F-194B-4083-93C9-C472C7EF0176}" type="datetimeFigureOut">
               <a:rPr lang="en-US" smtClean="0"/>
-              <a:t>12/28/2014</a:t>
+              <a:t>12/29/2014</a:t>
             </a:fld>
             <a:endParaRPr lang="en-US"/>
           </a:p>
@@ -1848,7 +1848,7 @@
           <a:p>
             <a:fld id="{8ED8215F-194B-4083-93C9-C472C7EF0176}" type="datetimeFigureOut">
               <a:rPr lang="en-US" smtClean="0"/>
-              <a:t>12/28/2014</a:t>
+              <a:t>12/29/2014</a:t>
             </a:fld>
             <a:endParaRPr lang="en-US"/>
           </a:p>
@@ -2125,7 +2125,7 @@
           <a:p>
             <a:fld id="{8ED8215F-194B-4083-93C9-C472C7EF0176}" type="datetimeFigureOut">
               <a:rPr lang="en-US" smtClean="0"/>
-              <a:t>12/28/2014</a:t>
+              <a:t>12/29/2014</a:t>
             </a:fld>
             <a:endParaRPr lang="en-US"/>
           </a:p>
@@ -2378,7 +2378,7 @@
           <a:p>
             <a:fld id="{8ED8215F-194B-4083-93C9-C472C7EF0176}" type="datetimeFigureOut">
               <a:rPr lang="en-US" smtClean="0"/>
-              <a:t>12/28/2014</a:t>
+              <a:t>12/29/2014</a:t>
             </a:fld>
             <a:endParaRPr lang="en-US"/>
           </a:p>
@@ -2591,7 +2591,7 @@
           <a:p>
             <a:fld id="{8ED8215F-194B-4083-93C9-C472C7EF0176}" type="datetimeFigureOut">
               <a:rPr lang="en-US" smtClean="0"/>
-              <a:t>12/28/2014</a:t>
+              <a:t>12/29/2014</a:t>
             </a:fld>
             <a:endParaRPr lang="en-US"/>
           </a:p>
@@ -3906,7 +3906,7 @@
           <a:graphicData uri="http://schemas.openxmlformats.org/presentationml/2006/ole">
             <mc:AlternateContent xmlns:mc="http://schemas.openxmlformats.org/markup-compatibility/2006">
               <mc:Choice xmlns:v="urn:schemas-microsoft-com:vml" Requires="v">
-                <p:oleObj spid="_x0000_s1153" name="Bitmap Image" r:id="rId3" imgW="5649114" imgH="7287642" progId="Paint.Picture">
+                <p:oleObj spid="_x0000_s1156" name="Bitmap Image" r:id="rId3" imgW="5649114" imgH="7287642" progId="Paint.Picture">
                   <p:embed/>
                 </p:oleObj>
               </mc:Choice>
@@ -4731,7 +4731,9 @@
         </p:nvSpPr>
         <p:spPr/>
         <p:txBody>
-          <a:bodyPr/>
+          <a:bodyPr>
+            <a:normAutofit lnSpcReduction="10000"/>
+          </a:bodyPr>
           <a:lstStyle/>
           <a:p>
             <a:pPr algn="r" rtl="1"/>
@@ -4796,13 +4798,40 @@
               <a:rPr lang="fa-IR" dirty="0" smtClean="0">
                 <a:cs typeface="B Nazanin" panose="00000400000000000000" pitchFamily="2" charset="-78"/>
               </a:rPr>
-              <a:t>الگوریتم پیشنهادی نیازمند داده آموزشی برچسب خورده یا لیست روابط از قبل نیست</a:t>
-            </a:r>
-            <a:r>
-              <a:rPr lang="fa-IR" smtClean="0">
-                <a:cs typeface="B Nazanin" panose="00000400000000000000" pitchFamily="2" charset="-78"/>
-              </a:rPr>
-              <a:t>. </a:t>
+              <a:t>الگوریتم پیشنهادی نیازمند داده آموزشی برچسب خورده یا لیست روابط از قبل نیست. </a:t>
+            </a:r>
+            <a:endParaRPr lang="fa-IR" dirty="0" smtClean="0">
+              <a:cs typeface="B Nazanin" panose="00000400000000000000" pitchFamily="2" charset="-78"/>
+            </a:endParaRPr>
+          </a:p>
+          <a:p>
+            <a:pPr algn="r" rtl="1"/>
+            <a:r>
+              <a:rPr lang="fa-IR" dirty="0" smtClean="0">
+                <a:cs typeface="B Nazanin" panose="00000400000000000000" pitchFamily="2" charset="-78"/>
+              </a:rPr>
+              <a:t>در واقع الگوریتم ما برای استخراج رابطه </a:t>
+            </a:r>
+            <a:r>
+              <a:rPr lang="en-US" dirty="0" smtClean="0">
+                <a:cs typeface="B Nazanin" panose="00000400000000000000" pitchFamily="2" charset="-78"/>
+              </a:rPr>
+              <a:t>Language Learning</a:t>
+            </a:r>
+            <a:r>
+              <a:rPr lang="fa-IR" dirty="0" smtClean="0">
+                <a:cs typeface="B Nazanin" panose="00000400000000000000" pitchFamily="2" charset="-78"/>
+              </a:rPr>
+              <a:t> انجام میدهد.</a:t>
+            </a:r>
+          </a:p>
+          <a:p>
+            <a:pPr algn="r" rtl="1"/>
+            <a:r>
+              <a:rPr lang="fa-IR" dirty="0" smtClean="0">
+                <a:cs typeface="B Nazanin" panose="00000400000000000000" pitchFamily="2" charset="-78"/>
+              </a:rPr>
+              <a:t>میخواهیم زبان فارسی را با استفاده از قالب ها مدل کنیم. سپس از این مدل تولید شده برای استخراج روابط مفهومی از متن استفاده کنیم.</a:t>
             </a:r>
             <a:endParaRPr lang="fa-IR" dirty="0">
               <a:cs typeface="B Nazanin" panose="00000400000000000000" pitchFamily="2" charset="-78"/>

</xml_diff>